<commit_message>
minor changes to cont chart
</commit_message>
<xml_diff>
--- a/latex/graphics/cont_chart.pptx
+++ b/latex/graphics/cont_chart.pptx
@@ -2957,6 +2957,16 @@
 <file path=ppt/slides/slide1.xml><?xml version="1.0" encoding="utf-8"?>
 <p:sld xmlns:a="http://schemas.openxmlformats.org/drawingml/2006/main" xmlns:r="http://schemas.openxmlformats.org/officeDocument/2006/relationships" xmlns:p="http://schemas.openxmlformats.org/presentationml/2006/main">
   <p:cSld>
+    <p:bg>
+      <p:bgPr>
+        <a:solidFill>
+          <a:schemeClr val="bg1">
+            <a:alpha val="0"/>
+          </a:schemeClr>
+        </a:solidFill>
+        <a:effectLst/>
+      </p:bgPr>
+    </p:bg>
     <p:spTree>
       <p:nvGrpSpPr>
         <p:cNvPr id="1" name=""/>
@@ -3121,7 +3131,7 @@
         </p:nvSpPr>
         <p:spPr>
           <a:xfrm>
-            <a:off x="2923149" y="4205592"/>
+            <a:off x="2928134" y="4200155"/>
             <a:ext cx="2515626" cy="323350"/>
           </a:xfrm>
           <a:prstGeom prst="rect">
@@ -3437,7 +3447,7 @@
         </p:nvSpPr>
         <p:spPr>
           <a:xfrm>
-            <a:off x="1823553" y="5390689"/>
+            <a:off x="1823554" y="5162282"/>
             <a:ext cx="2527093" cy="323350"/>
           </a:xfrm>
           <a:prstGeom prst="rect">
@@ -3542,8 +3552,8 @@
         </p:nvCxnSpPr>
         <p:spPr>
           <a:xfrm flipH="1">
-            <a:off x="2395633" y="3562825"/>
-            <a:ext cx="1" cy="1833099"/>
+            <a:off x="2395065" y="3562825"/>
+            <a:ext cx="570" cy="1598199"/>
           </a:xfrm>
           <a:prstGeom prst="straightConnector1">
             <a:avLst/>
@@ -3727,7 +3737,7 @@
         <p:spPr>
           <a:xfrm flipH="1">
             <a:off x="3662813" y="4530372"/>
-            <a:ext cx="1" cy="865552"/>
+            <a:ext cx="2" cy="627388"/>
           </a:xfrm>
           <a:prstGeom prst="straightConnector1">
             <a:avLst/>
@@ -3762,7 +3772,7 @@
         </p:nvSpPr>
         <p:spPr>
           <a:xfrm>
-            <a:off x="3600149" y="4997369"/>
+            <a:off x="3611385" y="4713099"/>
             <a:ext cx="1935915" cy="292388"/>
           </a:xfrm>
           <a:prstGeom prst="rect">
@@ -3804,8 +3814,8 @@
         </p:nvCxnSpPr>
         <p:spPr>
           <a:xfrm>
-            <a:off x="2395065" y="5719274"/>
-            <a:ext cx="4715" cy="1248962"/>
+            <a:off x="2392440" y="5484374"/>
+            <a:ext cx="0" cy="2037200"/>
           </a:xfrm>
           <a:prstGeom prst="straightConnector1">
             <a:avLst/>
@@ -3925,8 +3935,8 @@
         </p:nvCxnSpPr>
         <p:spPr>
           <a:xfrm flipH="1">
-            <a:off x="3662813" y="5711259"/>
-            <a:ext cx="4802" cy="1255718"/>
+            <a:off x="3662813" y="5490154"/>
+            <a:ext cx="8288" cy="2031420"/>
           </a:xfrm>
           <a:prstGeom prst="straightConnector1">
             <a:avLst/>
@@ -4042,7 +4052,7 @@
         <p:spPr>
           <a:xfrm>
             <a:off x="798163" y="1883044"/>
-            <a:ext cx="4943959" cy="4209484"/>
+            <a:ext cx="4943959" cy="3959817"/>
           </a:xfrm>
           <a:prstGeom prst="rect">
             <a:avLst/>
@@ -4050,8 +4060,9 @@
           <a:noFill/>
           <a:ln w="25400">
             <a:solidFill>
-              <a:schemeClr val="accent1"/>
+              <a:schemeClr val="tx1"/>
             </a:solidFill>
+            <a:prstDash val="dash"/>
           </a:ln>
         </p:spPr>
         <p:style>
@@ -4089,8 +4100,8 @@
         </p:nvCxnSpPr>
         <p:spPr>
           <a:xfrm rot="10800000" flipV="1">
-            <a:off x="1185301" y="3401149"/>
-            <a:ext cx="638255" cy="3567087"/>
+            <a:off x="1190625" y="3401149"/>
+            <a:ext cx="632930" cy="4120425"/>
           </a:xfrm>
           <a:prstGeom prst="bentConnector2">
             <a:avLst/>
@@ -4125,8 +4136,8 @@
         </p:nvCxnSpPr>
         <p:spPr>
           <a:xfrm flipH="1">
-            <a:off x="457200" y="6966977"/>
-            <a:ext cx="2014017" cy="0"/>
+            <a:off x="457201" y="6966977"/>
+            <a:ext cx="1935239" cy="0"/>
           </a:xfrm>
           <a:prstGeom prst="line">
             <a:avLst/>
@@ -4198,8 +4209,8 @@
         </p:nvCxnSpPr>
         <p:spPr>
           <a:xfrm flipH="1">
-            <a:off x="3561099" y="6966977"/>
-            <a:ext cx="2502867" cy="0"/>
+            <a:off x="3662813" y="6966977"/>
+            <a:ext cx="2401154" cy="0"/>
           </a:xfrm>
           <a:prstGeom prst="line">
             <a:avLst/>

</xml_diff>

<commit_message>
update chart Please enter the commit message for your changes. Lines starting
</commit_message>
<xml_diff>
--- a/latex/graphics/cont_chart.pptx
+++ b/latex/graphics/cont_chart.pptx
@@ -243,7 +243,7 @@
           <a:p>
             <a:fld id="{1D676800-2E8A-4B51-9771-DF92EA39BBAF}" type="datetimeFigureOut">
               <a:rPr lang="de-CH" smtClean="0"/>
-              <a:t>06.01.2017</a:t>
+              <a:t>08.01.2017</a:t>
             </a:fld>
             <a:endParaRPr lang="de-CH"/>
           </a:p>
@@ -413,7 +413,7 @@
           <a:p>
             <a:fld id="{1D676800-2E8A-4B51-9771-DF92EA39BBAF}" type="datetimeFigureOut">
               <a:rPr lang="de-CH" smtClean="0"/>
-              <a:t>06.01.2017</a:t>
+              <a:t>08.01.2017</a:t>
             </a:fld>
             <a:endParaRPr lang="de-CH"/>
           </a:p>
@@ -593,7 +593,7 @@
           <a:p>
             <a:fld id="{1D676800-2E8A-4B51-9771-DF92EA39BBAF}" type="datetimeFigureOut">
               <a:rPr lang="de-CH" smtClean="0"/>
-              <a:t>06.01.2017</a:t>
+              <a:t>08.01.2017</a:t>
             </a:fld>
             <a:endParaRPr lang="de-CH"/>
           </a:p>
@@ -763,7 +763,7 @@
           <a:p>
             <a:fld id="{1D676800-2E8A-4B51-9771-DF92EA39BBAF}" type="datetimeFigureOut">
               <a:rPr lang="de-CH" smtClean="0"/>
-              <a:t>06.01.2017</a:t>
+              <a:t>08.01.2017</a:t>
             </a:fld>
             <a:endParaRPr lang="de-CH"/>
           </a:p>
@@ -1007,7 +1007,7 @@
           <a:p>
             <a:fld id="{1D676800-2E8A-4B51-9771-DF92EA39BBAF}" type="datetimeFigureOut">
               <a:rPr lang="de-CH" smtClean="0"/>
-              <a:t>06.01.2017</a:t>
+              <a:t>08.01.2017</a:t>
             </a:fld>
             <a:endParaRPr lang="de-CH"/>
           </a:p>
@@ -1239,7 +1239,7 @@
           <a:p>
             <a:fld id="{1D676800-2E8A-4B51-9771-DF92EA39BBAF}" type="datetimeFigureOut">
               <a:rPr lang="de-CH" smtClean="0"/>
-              <a:t>06.01.2017</a:t>
+              <a:t>08.01.2017</a:t>
             </a:fld>
             <a:endParaRPr lang="de-CH"/>
           </a:p>
@@ -1606,7 +1606,7 @@
           <a:p>
             <a:fld id="{1D676800-2E8A-4B51-9771-DF92EA39BBAF}" type="datetimeFigureOut">
               <a:rPr lang="de-CH" smtClean="0"/>
-              <a:t>06.01.2017</a:t>
+              <a:t>08.01.2017</a:t>
             </a:fld>
             <a:endParaRPr lang="de-CH"/>
           </a:p>
@@ -1724,7 +1724,7 @@
           <a:p>
             <a:fld id="{1D676800-2E8A-4B51-9771-DF92EA39BBAF}" type="datetimeFigureOut">
               <a:rPr lang="de-CH" smtClean="0"/>
-              <a:t>06.01.2017</a:t>
+              <a:t>08.01.2017</a:t>
             </a:fld>
             <a:endParaRPr lang="de-CH"/>
           </a:p>
@@ -1819,7 +1819,7 @@
           <a:p>
             <a:fld id="{1D676800-2E8A-4B51-9771-DF92EA39BBAF}" type="datetimeFigureOut">
               <a:rPr lang="de-CH" smtClean="0"/>
-              <a:t>06.01.2017</a:t>
+              <a:t>08.01.2017</a:t>
             </a:fld>
             <a:endParaRPr lang="de-CH"/>
           </a:p>
@@ -2096,7 +2096,7 @@
           <a:p>
             <a:fld id="{1D676800-2E8A-4B51-9771-DF92EA39BBAF}" type="datetimeFigureOut">
               <a:rPr lang="de-CH" smtClean="0"/>
-              <a:t>06.01.2017</a:t>
+              <a:t>08.01.2017</a:t>
             </a:fld>
             <a:endParaRPr lang="de-CH"/>
           </a:p>
@@ -2353,7 +2353,7 @@
           <a:p>
             <a:fld id="{1D676800-2E8A-4B51-9771-DF92EA39BBAF}" type="datetimeFigureOut">
               <a:rPr lang="de-CH" smtClean="0"/>
-              <a:t>06.01.2017</a:t>
+              <a:t>08.01.2017</a:t>
             </a:fld>
             <a:endParaRPr lang="de-CH"/>
           </a:p>
@@ -2566,7 +2566,7 @@
           <a:p>
             <a:fld id="{1D676800-2E8A-4B51-9771-DF92EA39BBAF}" type="datetimeFigureOut">
               <a:rPr lang="de-CH" smtClean="0"/>
-              <a:t>06.01.2017</a:t>
+              <a:t>08.01.2017</a:t>
             </a:fld>
             <a:endParaRPr lang="de-CH"/>
           </a:p>
@@ -2981,1299 +2981,1824 @@
           <a:chExt cx="0" cy="0"/>
         </a:xfrm>
       </p:grpSpPr>
-      <p:sp>
-        <p:nvSpPr>
-          <p:cNvPr id="7" name="Rectangle 6"/>
-          <p:cNvSpPr/>
+      <p:grpSp>
+        <p:nvGrpSpPr>
+          <p:cNvPr id="130" name="Group 129"/>
+          <p:cNvGrpSpPr/>
           <p:nvPr/>
-        </p:nvSpPr>
-        <p:spPr>
+        </p:nvGrpSpPr>
+        <p:grpSpPr>
           <a:xfrm>
-            <a:off x="1823554" y="2273584"/>
-            <a:ext cx="2517491" cy="323350"/>
+            <a:off x="307490" y="556292"/>
+            <a:ext cx="6444137" cy="8081377"/>
+            <a:chOff x="307490" y="556292"/>
+            <a:chExt cx="6444137" cy="8081377"/>
           </a:xfrm>
-          <a:prstGeom prst="rect">
-            <a:avLst/>
-          </a:prstGeom>
-          <a:noFill/>
-          <a:ln w="12700">
-            <a:solidFill>
-              <a:schemeClr val="tx1"/>
-            </a:solidFill>
-          </a:ln>
-        </p:spPr>
-        <p:style>
-          <a:lnRef idx="2">
-            <a:schemeClr val="accent1">
-              <a:shade val="50000"/>
-            </a:schemeClr>
-          </a:lnRef>
-          <a:fillRef idx="1">
-            <a:schemeClr val="accent1"/>
-          </a:fillRef>
-          <a:effectRef idx="0">
-            <a:schemeClr val="accent1"/>
-          </a:effectRef>
-          <a:fontRef idx="minor">
-            <a:schemeClr val="lt1"/>
-          </a:fontRef>
-        </p:style>
-        <p:txBody>
-          <a:bodyPr rot="0" spcFirstLastPara="0" vertOverflow="overflow" horzOverflow="overflow" vert="horz" wrap="square" lIns="132080" tIns="66041" rIns="132080" bIns="66041" numCol="1" spcCol="0" rtlCol="0" fromWordArt="0" anchor="ctr" anchorCtr="0" forceAA="0" compatLnSpc="1">
-            <a:prstTxWarp prst="textNoShape">
+        </p:grpSpPr>
+        <p:sp>
+          <p:nvSpPr>
+            <p:cNvPr id="7" name="Rectangle 6"/>
+            <p:cNvSpPr/>
+            <p:nvPr/>
+          </p:nvSpPr>
+          <p:spPr>
+            <a:xfrm>
+              <a:off x="1823554" y="2273584"/>
+              <a:ext cx="2517491" cy="323350"/>
+            </a:xfrm>
+            <a:prstGeom prst="rect">
               <a:avLst/>
-            </a:prstTxWarp>
-            <a:noAutofit/>
-          </a:bodyPr>
-          <a:lstStyle/>
-          <a:p>
-            <a:pPr algn="ctr"/>
-            <a:r>
-              <a:rPr lang="de-CH" sz="1518" dirty="0" err="1" smtClean="0">
+            </a:prstGeom>
+            <a:noFill/>
+            <a:ln w="12700">
+              <a:solidFill>
+                <a:schemeClr val="tx1"/>
+              </a:solidFill>
+            </a:ln>
+          </p:spPr>
+          <p:style>
+            <a:lnRef idx="2">
+              <a:schemeClr val="accent1">
+                <a:shade val="50000"/>
+              </a:schemeClr>
+            </a:lnRef>
+            <a:fillRef idx="1">
+              <a:schemeClr val="accent1"/>
+            </a:fillRef>
+            <a:effectRef idx="0">
+              <a:schemeClr val="accent1"/>
+            </a:effectRef>
+            <a:fontRef idx="minor">
+              <a:schemeClr val="lt1"/>
+            </a:fontRef>
+          </p:style>
+          <p:txBody>
+            <a:bodyPr rot="0" spcFirstLastPara="0" vertOverflow="overflow" horzOverflow="overflow" vert="horz" wrap="square" lIns="132080" tIns="66041" rIns="132080" bIns="66041" numCol="1" spcCol="0" rtlCol="0" fromWordArt="0" anchor="ctr" anchorCtr="0" forceAA="0" compatLnSpc="1">
+              <a:prstTxWarp prst="textNoShape">
+                <a:avLst/>
+              </a:prstTxWarp>
+              <a:noAutofit/>
+            </a:bodyPr>
+            <a:lstStyle/>
+            <a:p>
+              <a:pPr algn="ctr"/>
+              <a:r>
+                <a:rPr lang="de-CH" sz="1518" dirty="0" err="1" smtClean="0">
+                  <a:solidFill>
+                    <a:schemeClr val="tx1"/>
+                  </a:solidFill>
+                </a:rPr>
+                <a:t>findCorrespondences_cont</a:t>
+              </a:r>
+              <a:r>
+                <a:rPr lang="de-CH" sz="1518" dirty="0" smtClean="0">
+                  <a:solidFill>
+                    <a:schemeClr val="tx1"/>
+                  </a:solidFill>
+                </a:rPr>
+                <a:t>()</a:t>
+              </a:r>
+              <a:endParaRPr lang="de-CH" sz="2601" dirty="0">
                 <a:solidFill>
                   <a:schemeClr val="tx1"/>
                 </a:solidFill>
-              </a:rPr>
-              <a:t>findCorrespondences_cont</a:t>
-            </a:r>
-            <a:r>
-              <a:rPr lang="de-CH" sz="1518" dirty="0" smtClean="0">
+              </a:endParaRPr>
+            </a:p>
+          </p:txBody>
+        </p:sp>
+        <p:sp>
+          <p:nvSpPr>
+            <p:cNvPr id="9" name="Rectangle 8"/>
+            <p:cNvSpPr/>
+            <p:nvPr/>
+          </p:nvSpPr>
+          <p:spPr>
+            <a:xfrm>
+              <a:off x="1823555" y="3239475"/>
+              <a:ext cx="2517490" cy="323350"/>
+            </a:xfrm>
+            <a:prstGeom prst="rect">
+              <a:avLst/>
+            </a:prstGeom>
+            <a:noFill/>
+            <a:ln w="12700">
+              <a:solidFill>
+                <a:schemeClr val="tx1"/>
+              </a:solidFill>
+            </a:ln>
+          </p:spPr>
+          <p:style>
+            <a:lnRef idx="2">
+              <a:schemeClr val="accent1">
+                <a:shade val="50000"/>
+              </a:schemeClr>
+            </a:lnRef>
+            <a:fillRef idx="1">
+              <a:schemeClr val="accent1"/>
+            </a:fillRef>
+            <a:effectRef idx="0">
+              <a:schemeClr val="accent1"/>
+            </a:effectRef>
+            <a:fontRef idx="minor">
+              <a:schemeClr val="lt1"/>
+            </a:fontRef>
+          </p:style>
+          <p:txBody>
+            <a:bodyPr rot="0" spcFirstLastPara="0" vertOverflow="overflow" horzOverflow="overflow" vert="horz" wrap="square" lIns="132080" tIns="66041" rIns="132080" bIns="66041" numCol="1" spcCol="0" rtlCol="0" fromWordArt="0" anchor="ctr" anchorCtr="0" forceAA="0" compatLnSpc="1">
+              <a:prstTxWarp prst="textNoShape">
+                <a:avLst/>
+              </a:prstTxWarp>
+              <a:noAutofit/>
+            </a:bodyPr>
+            <a:lstStyle/>
+            <a:p>
+              <a:pPr algn="ctr"/>
+              <a:r>
+                <a:rPr lang="de-CH" sz="1518" dirty="0" smtClean="0">
+                  <a:solidFill>
+                    <a:schemeClr val="tx1"/>
+                  </a:solidFill>
+                </a:rPr>
+                <a:t>p3pRansac</a:t>
+              </a:r>
+              <a:r>
+                <a:rPr lang="de-CH" sz="1518" dirty="0">
+                  <a:solidFill>
+                    <a:schemeClr val="tx1"/>
+                  </a:solidFill>
+                </a:rPr>
+                <a:t>()</a:t>
+              </a:r>
+              <a:endParaRPr lang="de-CH" sz="2601" dirty="0">
                 <a:solidFill>
                   <a:schemeClr val="tx1"/>
                 </a:solidFill>
-              </a:rPr>
-              <a:t>()</a:t>
-            </a:r>
-            <a:endParaRPr lang="de-CH" sz="2601" dirty="0">
+              </a:endParaRPr>
+            </a:p>
+          </p:txBody>
+        </p:sp>
+        <p:sp>
+          <p:nvSpPr>
+            <p:cNvPr id="10" name="Rectangle 9"/>
+            <p:cNvSpPr/>
+            <p:nvPr/>
+          </p:nvSpPr>
+          <p:spPr>
+            <a:xfrm>
+              <a:off x="2928134" y="4200155"/>
+              <a:ext cx="2515626" cy="323350"/>
+            </a:xfrm>
+            <a:prstGeom prst="rect">
+              <a:avLst/>
+            </a:prstGeom>
+            <a:noFill/>
+            <a:ln w="12700">
               <a:solidFill>
                 <a:schemeClr val="tx1"/>
               </a:solidFill>
-            </a:endParaRPr>
-          </a:p>
-        </p:txBody>
-      </p:sp>
-      <p:sp>
-        <p:nvSpPr>
-          <p:cNvPr id="9" name="Rectangle 8"/>
-          <p:cNvSpPr/>
-          <p:nvPr/>
-        </p:nvSpPr>
-        <p:spPr>
-          <a:xfrm>
-            <a:off x="1823555" y="3239475"/>
-            <a:ext cx="2517490" cy="323350"/>
-          </a:xfrm>
-          <a:prstGeom prst="rect">
-            <a:avLst/>
-          </a:prstGeom>
-          <a:noFill/>
-          <a:ln w="12700">
-            <a:solidFill>
-              <a:schemeClr val="tx1"/>
-            </a:solidFill>
-          </a:ln>
-        </p:spPr>
-        <p:style>
-          <a:lnRef idx="2">
-            <a:schemeClr val="accent1">
-              <a:shade val="50000"/>
-            </a:schemeClr>
-          </a:lnRef>
-          <a:fillRef idx="1">
-            <a:schemeClr val="accent1"/>
-          </a:fillRef>
-          <a:effectRef idx="0">
-            <a:schemeClr val="accent1"/>
-          </a:effectRef>
-          <a:fontRef idx="minor">
-            <a:schemeClr val="lt1"/>
-          </a:fontRef>
-        </p:style>
-        <p:txBody>
-          <a:bodyPr rot="0" spcFirstLastPara="0" vertOverflow="overflow" horzOverflow="overflow" vert="horz" wrap="square" lIns="132080" tIns="66041" rIns="132080" bIns="66041" numCol="1" spcCol="0" rtlCol="0" fromWordArt="0" anchor="ctr" anchorCtr="0" forceAA="0" compatLnSpc="1">
-            <a:prstTxWarp prst="textNoShape">
-              <a:avLst/>
-            </a:prstTxWarp>
-            <a:noAutofit/>
-          </a:bodyPr>
-          <a:lstStyle/>
-          <a:p>
-            <a:pPr algn="ctr"/>
-            <a:r>
-              <a:rPr lang="de-CH" sz="1518" dirty="0" smtClean="0">
+            </a:ln>
+          </p:spPr>
+          <p:style>
+            <a:lnRef idx="2">
+              <a:schemeClr val="accent1">
+                <a:shade val="50000"/>
+              </a:schemeClr>
+            </a:lnRef>
+            <a:fillRef idx="1">
+              <a:schemeClr val="accent1"/>
+            </a:fillRef>
+            <a:effectRef idx="0">
+              <a:schemeClr val="accent1"/>
+            </a:effectRef>
+            <a:fontRef idx="minor">
+              <a:schemeClr val="lt1"/>
+            </a:fontRef>
+          </p:style>
+          <p:txBody>
+            <a:bodyPr rot="0" spcFirstLastPara="0" vertOverflow="overflow" horzOverflow="overflow" vert="horz" wrap="square" lIns="132080" tIns="66041" rIns="132080" bIns="66041" numCol="1" spcCol="0" rtlCol="0" fromWordArt="0" anchor="ctr" anchorCtr="0" forceAA="0" compatLnSpc="1">
+              <a:prstTxWarp prst="textNoShape">
+                <a:avLst/>
+              </a:prstTxWarp>
+              <a:noAutofit/>
+            </a:bodyPr>
+            <a:lstStyle/>
+            <a:p>
+              <a:pPr algn="ctr"/>
+              <a:r>
+                <a:rPr lang="de-CH" sz="1518" dirty="0" err="1" smtClean="0">
+                  <a:solidFill>
+                    <a:schemeClr val="tx1"/>
+                  </a:solidFill>
+                </a:rPr>
+                <a:t>updateKpTracks</a:t>
+              </a:r>
+              <a:r>
+                <a:rPr lang="de-CH" sz="1518" dirty="0" smtClean="0">
+                  <a:solidFill>
+                    <a:schemeClr val="tx1"/>
+                  </a:solidFill>
+                </a:rPr>
+                <a:t>()</a:t>
+              </a:r>
+              <a:endParaRPr lang="de-CH" sz="2601" dirty="0">
                 <a:solidFill>
                   <a:schemeClr val="tx1"/>
                 </a:solidFill>
-              </a:rPr>
-              <a:t>p3pRansac</a:t>
-            </a:r>
-            <a:r>
-              <a:rPr lang="de-CH" sz="1518" dirty="0">
+              </a:endParaRPr>
+            </a:p>
+          </p:txBody>
+        </p:sp>
+        <p:cxnSp>
+          <p:nvCxnSpPr>
+            <p:cNvPr id="16" name="Straight Arrow Connector 15"/>
+            <p:cNvCxnSpPr/>
+            <p:nvPr/>
+          </p:nvCxnSpPr>
+          <p:spPr>
+            <a:xfrm>
+              <a:off x="2678979" y="557939"/>
+              <a:ext cx="229" cy="1720682"/>
+            </a:xfrm>
+            <a:prstGeom prst="straightConnector1">
+              <a:avLst/>
+            </a:prstGeom>
+            <a:ln w="9525">
+              <a:solidFill>
+                <a:schemeClr val="tx1"/>
+              </a:solidFill>
+              <a:tailEnd type="triangle"/>
+            </a:ln>
+          </p:spPr>
+          <p:style>
+            <a:lnRef idx="1">
+              <a:schemeClr val="accent1"/>
+            </a:lnRef>
+            <a:fillRef idx="0">
+              <a:schemeClr val="accent1"/>
+            </a:fillRef>
+            <a:effectRef idx="0">
+              <a:schemeClr val="accent1"/>
+            </a:effectRef>
+            <a:fontRef idx="minor">
+              <a:schemeClr val="tx1"/>
+            </a:fontRef>
+          </p:style>
+        </p:cxnSp>
+        <p:cxnSp>
+          <p:nvCxnSpPr>
+            <p:cNvPr id="19" name="Straight Arrow Connector 18"/>
+            <p:cNvCxnSpPr/>
+            <p:nvPr/>
+          </p:nvCxnSpPr>
+          <p:spPr>
+            <a:xfrm>
+              <a:off x="3600149" y="557939"/>
+              <a:ext cx="0" cy="1715645"/>
+            </a:xfrm>
+            <a:prstGeom prst="straightConnector1">
+              <a:avLst/>
+            </a:prstGeom>
+            <a:ln w="9525">
+              <a:solidFill>
+                <a:schemeClr val="tx1"/>
+              </a:solidFill>
+              <a:tailEnd type="triangle"/>
+            </a:ln>
+          </p:spPr>
+          <p:style>
+            <a:lnRef idx="1">
+              <a:schemeClr val="accent1"/>
+            </a:lnRef>
+            <a:fillRef idx="0">
+              <a:schemeClr val="accent1"/>
+            </a:fillRef>
+            <a:effectRef idx="0">
+              <a:schemeClr val="accent1"/>
+            </a:effectRef>
+            <a:fontRef idx="minor">
+              <a:schemeClr val="tx1"/>
+            </a:fontRef>
+          </p:style>
+        </p:cxnSp>
+        <p:sp>
+          <p:nvSpPr>
+            <p:cNvPr id="23" name="TextBox 22"/>
+            <p:cNvSpPr txBox="1"/>
+            <p:nvPr/>
+          </p:nvSpPr>
+          <p:spPr>
+            <a:xfrm>
+              <a:off x="1348345" y="556292"/>
+              <a:ext cx="1342099" cy="692497"/>
+            </a:xfrm>
+            <a:prstGeom prst="rect">
+              <a:avLst/>
+            </a:prstGeom>
+            <a:noFill/>
+          </p:spPr>
+          <p:txBody>
+            <a:bodyPr wrap="none" rtlCol="0">
+              <a:spAutoFit/>
+            </a:bodyPr>
+            <a:lstStyle/>
+            <a:p>
+              <a:pPr algn="r"/>
+              <a:r>
+                <a:rPr lang="de-CH" sz="1300" dirty="0" smtClean="0"/>
+                <a:t>T_WC2</a:t>
+              </a:r>
+              <a:endParaRPr lang="de-CH" sz="1300" dirty="0" smtClean="0"/>
+            </a:p>
+            <a:p>
+              <a:pPr algn="r"/>
+              <a:r>
+                <a:rPr lang="de-CH" sz="1300" dirty="0" smtClean="0"/>
+                <a:t>Initial </a:t>
+              </a:r>
+              <a:r>
+                <a:rPr lang="de-CH" sz="1300" dirty="0" err="1" smtClean="0"/>
+                <a:t>Keypoints</a:t>
+              </a:r>
+              <a:endParaRPr lang="de-CH" sz="1300" dirty="0"/>
+            </a:p>
+            <a:p>
+              <a:pPr algn="r"/>
+              <a:r>
+                <a:rPr lang="de-CH" sz="1300" dirty="0" smtClean="0"/>
+                <a:t>Initial Landmarks</a:t>
+              </a:r>
+            </a:p>
+          </p:txBody>
+        </p:sp>
+        <p:cxnSp>
+          <p:nvCxnSpPr>
+            <p:cNvPr id="30" name="Straight Arrow Connector 29"/>
+            <p:cNvCxnSpPr>
+              <a:stCxn id="7" idx="2"/>
+              <a:endCxn id="9" idx="0"/>
+            </p:cNvCxnSpPr>
+            <p:nvPr/>
+          </p:nvCxnSpPr>
+          <p:spPr>
+            <a:xfrm>
+              <a:off x="3082300" y="2596934"/>
+              <a:ext cx="0" cy="642541"/>
+            </a:xfrm>
+            <a:prstGeom prst="straightConnector1">
+              <a:avLst/>
+            </a:prstGeom>
+            <a:ln w="9525">
+              <a:solidFill>
+                <a:schemeClr val="tx1"/>
+              </a:solidFill>
+              <a:tailEnd type="triangle"/>
+            </a:ln>
+          </p:spPr>
+          <p:style>
+            <a:lnRef idx="1">
+              <a:schemeClr val="accent1"/>
+            </a:lnRef>
+            <a:fillRef idx="0">
+              <a:schemeClr val="accent1"/>
+            </a:fillRef>
+            <a:effectRef idx="0">
+              <a:schemeClr val="accent1"/>
+            </a:effectRef>
+            <a:fontRef idx="minor">
+              <a:schemeClr val="tx1"/>
+            </a:fontRef>
+          </p:style>
+        </p:cxnSp>
+        <p:sp>
+          <p:nvSpPr>
+            <p:cNvPr id="31" name="TextBox 30"/>
+            <p:cNvSpPr txBox="1"/>
+            <p:nvPr/>
+          </p:nvSpPr>
+          <p:spPr>
+            <a:xfrm>
+              <a:off x="1579034" y="2758753"/>
+              <a:ext cx="1526765" cy="292388"/>
+            </a:xfrm>
+            <a:prstGeom prst="rect">
+              <a:avLst/>
+            </a:prstGeom>
+            <a:noFill/>
+          </p:spPr>
+          <p:txBody>
+            <a:bodyPr wrap="none" rtlCol="0">
+              <a:spAutoFit/>
+            </a:bodyPr>
+            <a:lstStyle/>
+            <a:p>
+              <a:r>
+                <a:rPr lang="de-CH" sz="1300" dirty="0" err="1" smtClean="0"/>
+                <a:t>Matching</a:t>
+              </a:r>
+              <a:r>
+                <a:rPr lang="de-CH" sz="1300" dirty="0" smtClean="0"/>
+                <a:t> </a:t>
+              </a:r>
+              <a:r>
+                <a:rPr lang="de-CH" sz="1300" dirty="0" err="1" smtClean="0"/>
+                <a:t>Keypoints</a:t>
+              </a:r>
+              <a:endParaRPr lang="de-CH" sz="1300" dirty="0"/>
+            </a:p>
+          </p:txBody>
+        </p:sp>
+        <p:sp>
+          <p:nvSpPr>
+            <p:cNvPr id="2" name="TextBox 1"/>
+            <p:cNvSpPr txBox="1"/>
+            <p:nvPr/>
+          </p:nvSpPr>
+          <p:spPr>
+            <a:xfrm>
+              <a:off x="5022371" y="556292"/>
+              <a:ext cx="1729256" cy="292388"/>
+            </a:xfrm>
+            <a:prstGeom prst="rect">
+              <a:avLst/>
+            </a:prstGeom>
+            <a:noFill/>
+          </p:spPr>
+          <p:txBody>
+            <a:bodyPr wrap="none" rtlCol="0">
+              <a:spAutoFit/>
+            </a:bodyPr>
+            <a:lstStyle/>
+            <a:p>
+              <a:r>
+                <a:rPr lang="de-CH" sz="1300" dirty="0" smtClean="0"/>
+                <a:t>Initial </a:t>
+              </a:r>
+              <a:r>
+                <a:rPr lang="de-CH" sz="1300" dirty="0" err="1" smtClean="0"/>
+                <a:t>Keypoint</a:t>
+              </a:r>
+              <a:r>
+                <a:rPr lang="de-CH" sz="1300" dirty="0" smtClean="0"/>
+                <a:t> </a:t>
+              </a:r>
+              <a:r>
+                <a:rPr lang="de-CH" sz="1300" dirty="0" err="1" smtClean="0"/>
+                <a:t>Tracker</a:t>
+              </a:r>
+              <a:endParaRPr lang="de-CH" sz="1300" dirty="0"/>
+            </a:p>
+          </p:txBody>
+        </p:sp>
+        <p:sp>
+          <p:nvSpPr>
+            <p:cNvPr id="29" name="Rectangle 28"/>
+            <p:cNvSpPr/>
+            <p:nvPr/>
+          </p:nvSpPr>
+          <p:spPr>
+            <a:xfrm>
+              <a:off x="1823554" y="5162282"/>
+              <a:ext cx="2527093" cy="323350"/>
+            </a:xfrm>
+            <a:prstGeom prst="rect">
+              <a:avLst/>
+            </a:prstGeom>
+            <a:noFill/>
+            <a:ln w="12700">
+              <a:solidFill>
+                <a:schemeClr val="tx1"/>
+              </a:solidFill>
+            </a:ln>
+          </p:spPr>
+          <p:style>
+            <a:lnRef idx="2">
+              <a:schemeClr val="accent1">
+                <a:shade val="50000"/>
+              </a:schemeClr>
+            </a:lnRef>
+            <a:fillRef idx="1">
+              <a:schemeClr val="accent1"/>
+            </a:fillRef>
+            <a:effectRef idx="0">
+              <a:schemeClr val="accent1"/>
+            </a:effectRef>
+            <a:fontRef idx="minor">
+              <a:schemeClr val="lt1"/>
+            </a:fontRef>
+          </p:style>
+          <p:txBody>
+            <a:bodyPr rot="0" spcFirstLastPara="0" vertOverflow="overflow" horzOverflow="overflow" vert="horz" wrap="square" lIns="132080" tIns="66041" rIns="132080" bIns="66041" numCol="1" spcCol="0" rtlCol="0" fromWordArt="0" anchor="ctr" anchorCtr="0" forceAA="0" compatLnSpc="1">
+              <a:prstTxWarp prst="textNoShape">
+                <a:avLst/>
+              </a:prstTxWarp>
+              <a:noAutofit/>
+            </a:bodyPr>
+            <a:lstStyle/>
+            <a:p>
+              <a:pPr algn="ctr"/>
+              <a:r>
+                <a:rPr lang="de-CH" sz="1518" dirty="0" err="1" smtClean="0">
+                  <a:solidFill>
+                    <a:schemeClr val="tx1"/>
+                  </a:solidFill>
+                </a:rPr>
+                <a:t>triangulateNewLandmarks</a:t>
+              </a:r>
+              <a:r>
+                <a:rPr lang="de-CH" sz="1518" dirty="0" smtClean="0">
+                  <a:solidFill>
+                    <a:schemeClr val="tx1"/>
+                  </a:solidFill>
+                </a:rPr>
+                <a:t>()</a:t>
+              </a:r>
+              <a:endParaRPr lang="de-CH" sz="2601" dirty="0">
                 <a:solidFill>
                   <a:schemeClr val="tx1"/>
                 </a:solidFill>
-              </a:rPr>
-              <a:t>()</a:t>
-            </a:r>
-            <a:endParaRPr lang="de-CH" sz="2601" dirty="0">
+              </a:endParaRPr>
+            </a:p>
+          </p:txBody>
+        </p:sp>
+        <p:sp>
+          <p:nvSpPr>
+            <p:cNvPr id="47" name="TextBox 46"/>
+            <p:cNvSpPr txBox="1"/>
+            <p:nvPr/>
+          </p:nvSpPr>
+          <p:spPr>
+            <a:xfrm>
+              <a:off x="3350748" y="2760255"/>
+              <a:ext cx="1305165" cy="292388"/>
+            </a:xfrm>
+            <a:prstGeom prst="rect">
+              <a:avLst/>
+            </a:prstGeom>
+            <a:noFill/>
+          </p:spPr>
+          <p:txBody>
+            <a:bodyPr wrap="none" rtlCol="0">
+              <a:spAutoFit/>
+            </a:bodyPr>
+            <a:lstStyle/>
+            <a:p>
+              <a:r>
+                <a:rPr lang="de-CH" sz="1300" dirty="0" smtClean="0"/>
+                <a:t>Query </a:t>
+              </a:r>
+              <a:r>
+                <a:rPr lang="de-CH" sz="1300" dirty="0" err="1" smtClean="0"/>
+                <a:t>Keypoints</a:t>
+              </a:r>
+              <a:endParaRPr lang="de-CH" sz="1300" dirty="0"/>
+            </a:p>
+          </p:txBody>
+        </p:sp>
+        <p:cxnSp>
+          <p:nvCxnSpPr>
+            <p:cNvPr id="52" name="Straight Arrow Connector 51"/>
+            <p:cNvCxnSpPr/>
+            <p:nvPr/>
+          </p:nvCxnSpPr>
+          <p:spPr>
+            <a:xfrm flipH="1">
+              <a:off x="2733208" y="3562825"/>
+              <a:ext cx="570" cy="1598199"/>
+            </a:xfrm>
+            <a:prstGeom prst="straightConnector1">
+              <a:avLst/>
+            </a:prstGeom>
+            <a:ln w="9525">
               <a:solidFill>
                 <a:schemeClr val="tx1"/>
               </a:solidFill>
-            </a:endParaRPr>
-          </a:p>
-        </p:txBody>
-      </p:sp>
-      <p:sp>
-        <p:nvSpPr>
-          <p:cNvPr id="10" name="Rectangle 9"/>
-          <p:cNvSpPr/>
-          <p:nvPr/>
-        </p:nvSpPr>
-        <p:spPr>
-          <a:xfrm>
-            <a:off x="2928134" y="4200155"/>
-            <a:ext cx="2515626" cy="323350"/>
-          </a:xfrm>
-          <a:prstGeom prst="rect">
-            <a:avLst/>
-          </a:prstGeom>
-          <a:noFill/>
-          <a:ln w="12700">
-            <a:solidFill>
+              <a:tailEnd type="triangle"/>
+            </a:ln>
+          </p:spPr>
+          <p:style>
+            <a:lnRef idx="1">
+              <a:schemeClr val="accent1"/>
+            </a:lnRef>
+            <a:fillRef idx="0">
+              <a:schemeClr val="accent1"/>
+            </a:fillRef>
+            <a:effectRef idx="0">
+              <a:schemeClr val="accent1"/>
+            </a:effectRef>
+            <a:fontRef idx="minor">
               <a:schemeClr val="tx1"/>
-            </a:solidFill>
-          </a:ln>
-        </p:spPr>
-        <p:style>
-          <a:lnRef idx="2">
-            <a:schemeClr val="accent1">
-              <a:shade val="50000"/>
-            </a:schemeClr>
-          </a:lnRef>
-          <a:fillRef idx="1">
-            <a:schemeClr val="accent1"/>
-          </a:fillRef>
-          <a:effectRef idx="0">
-            <a:schemeClr val="accent1"/>
-          </a:effectRef>
-          <a:fontRef idx="minor">
-            <a:schemeClr val="lt1"/>
-          </a:fontRef>
-        </p:style>
-        <p:txBody>
-          <a:bodyPr rot="0" spcFirstLastPara="0" vertOverflow="overflow" horzOverflow="overflow" vert="horz" wrap="square" lIns="132080" tIns="66041" rIns="132080" bIns="66041" numCol="1" spcCol="0" rtlCol="0" fromWordArt="0" anchor="ctr" anchorCtr="0" forceAA="0" compatLnSpc="1">
-            <a:prstTxWarp prst="textNoShape">
+            </a:fontRef>
+          </p:style>
+        </p:cxnSp>
+        <p:cxnSp>
+          <p:nvCxnSpPr>
+            <p:cNvPr id="54" name="Elbow Connector 53"/>
+            <p:cNvCxnSpPr/>
+            <p:nvPr/>
+          </p:nvCxnSpPr>
+          <p:spPr>
+            <a:xfrm>
+              <a:off x="2733208" y="3951967"/>
+              <a:ext cx="458548" cy="252195"/>
+            </a:xfrm>
+            <a:prstGeom prst="bentConnector3">
+              <a:avLst>
+                <a:gd name="adj1" fmla="val 99853"/>
+              </a:avLst>
+            </a:prstGeom>
+            <a:ln w="9525">
+              <a:solidFill>
+                <a:schemeClr val="tx1"/>
+              </a:solidFill>
+              <a:tailEnd type="triangle"/>
+            </a:ln>
+          </p:spPr>
+          <p:style>
+            <a:lnRef idx="1">
+              <a:schemeClr val="accent1"/>
+            </a:lnRef>
+            <a:fillRef idx="0">
+              <a:schemeClr val="accent1"/>
+            </a:fillRef>
+            <a:effectRef idx="0">
+              <a:schemeClr val="accent1"/>
+            </a:effectRef>
+            <a:fontRef idx="minor">
+              <a:schemeClr val="tx1"/>
+            </a:fontRef>
+          </p:style>
+        </p:cxnSp>
+        <p:sp>
+          <p:nvSpPr>
+            <p:cNvPr id="58" name="TextBox 57"/>
+            <p:cNvSpPr txBox="1"/>
+            <p:nvPr/>
+          </p:nvSpPr>
+          <p:spPr>
+            <a:xfrm>
+              <a:off x="2681234" y="3681355"/>
+              <a:ext cx="625299" cy="292388"/>
+            </a:xfrm>
+            <a:prstGeom prst="rect">
               <a:avLst/>
-            </a:prstTxWarp>
-            <a:noAutofit/>
-          </a:bodyPr>
-          <a:lstStyle/>
-          <a:p>
-            <a:pPr algn="ctr"/>
-            <a:r>
-              <a:rPr lang="de-CH" sz="1518" dirty="0" err="1" smtClean="0">
+            </a:prstGeom>
+            <a:noFill/>
+          </p:spPr>
+          <p:txBody>
+            <a:bodyPr wrap="none" rtlCol="0">
+              <a:spAutoFit/>
+            </a:bodyPr>
+            <a:lstStyle/>
+            <a:p>
+              <a:r>
+                <a:rPr lang="de-CH" sz="1300" dirty="0" err="1" smtClean="0"/>
+                <a:t>T_WCj</a:t>
+              </a:r>
+              <a:endParaRPr lang="de-CH" sz="1300" dirty="0"/>
+            </a:p>
+          </p:txBody>
+        </p:sp>
+        <p:cxnSp>
+          <p:nvCxnSpPr>
+            <p:cNvPr id="62" name="Straight Arrow Connector 61"/>
+            <p:cNvCxnSpPr/>
+            <p:nvPr/>
+          </p:nvCxnSpPr>
+          <p:spPr>
+            <a:xfrm>
+              <a:off x="5022371" y="557939"/>
+              <a:ext cx="0" cy="3646223"/>
+            </a:xfrm>
+            <a:prstGeom prst="straightConnector1">
+              <a:avLst/>
+            </a:prstGeom>
+            <a:ln w="9525">
+              <a:solidFill>
+                <a:schemeClr val="tx1"/>
+              </a:solidFill>
+              <a:tailEnd type="triangle"/>
+            </a:ln>
+          </p:spPr>
+          <p:style>
+            <a:lnRef idx="1">
+              <a:schemeClr val="accent1"/>
+            </a:lnRef>
+            <a:fillRef idx="0">
+              <a:schemeClr val="accent1"/>
+            </a:fillRef>
+            <a:effectRef idx="0">
+              <a:schemeClr val="accent1"/>
+            </a:effectRef>
+            <a:fontRef idx="minor">
+              <a:schemeClr val="tx1"/>
+            </a:fontRef>
+          </p:style>
+        </p:cxnSp>
+        <p:sp>
+          <p:nvSpPr>
+            <p:cNvPr id="64" name="TextBox 63"/>
+            <p:cNvSpPr txBox="1"/>
+            <p:nvPr/>
+          </p:nvSpPr>
+          <p:spPr>
+            <a:xfrm>
+              <a:off x="3611385" y="561918"/>
+              <a:ext cx="1218988" cy="492443"/>
+            </a:xfrm>
+            <a:prstGeom prst="rect">
+              <a:avLst/>
+            </a:prstGeom>
+            <a:noFill/>
+          </p:spPr>
+          <p:txBody>
+            <a:bodyPr wrap="none" rtlCol="0">
+              <a:spAutoFit/>
+            </a:bodyPr>
+            <a:lstStyle/>
+            <a:p>
+              <a:r>
+                <a:rPr lang="de-CH" sz="1300" dirty="0" err="1" smtClean="0"/>
+                <a:t>Current</a:t>
+              </a:r>
+              <a:r>
+                <a:rPr lang="de-CH" sz="1300" dirty="0" smtClean="0"/>
+                <a:t> Image</a:t>
+              </a:r>
+            </a:p>
+            <a:p>
+              <a:r>
+                <a:rPr lang="de-CH" sz="1300" dirty="0" err="1" smtClean="0"/>
+                <a:t>Previous</a:t>
+              </a:r>
+              <a:r>
+                <a:rPr lang="de-CH" sz="1300" dirty="0" smtClean="0"/>
+                <a:t> Image</a:t>
+              </a:r>
+              <a:endParaRPr lang="de-CH" sz="1300" dirty="0"/>
+            </a:p>
+          </p:txBody>
+        </p:sp>
+        <p:cxnSp>
+          <p:nvCxnSpPr>
+            <p:cNvPr id="71" name="Straight Arrow Connector 70"/>
+            <p:cNvCxnSpPr/>
+            <p:nvPr/>
+          </p:nvCxnSpPr>
+          <p:spPr>
+            <a:xfrm flipH="1">
+              <a:off x="3850934" y="4530372"/>
+              <a:ext cx="2" cy="627388"/>
+            </a:xfrm>
+            <a:prstGeom prst="straightConnector1">
+              <a:avLst/>
+            </a:prstGeom>
+            <a:ln w="9525">
+              <a:solidFill>
+                <a:schemeClr val="tx1"/>
+              </a:solidFill>
+              <a:tailEnd type="triangle"/>
+            </a:ln>
+          </p:spPr>
+          <p:style>
+            <a:lnRef idx="1">
+              <a:schemeClr val="accent1"/>
+            </a:lnRef>
+            <a:fillRef idx="0">
+              <a:schemeClr val="accent1"/>
+            </a:fillRef>
+            <a:effectRef idx="0">
+              <a:schemeClr val="accent1"/>
+            </a:effectRef>
+            <a:fontRef idx="minor">
+              <a:schemeClr val="tx1"/>
+            </a:fontRef>
+          </p:style>
+        </p:cxnSp>
+        <p:sp>
+          <p:nvSpPr>
+            <p:cNvPr id="73" name="TextBox 72"/>
+            <p:cNvSpPr txBox="1"/>
+            <p:nvPr/>
+          </p:nvSpPr>
+          <p:spPr>
+            <a:xfrm>
+              <a:off x="3809030" y="4713099"/>
+              <a:ext cx="1935915" cy="292388"/>
+            </a:xfrm>
+            <a:prstGeom prst="rect">
+              <a:avLst/>
+            </a:prstGeom>
+            <a:noFill/>
+          </p:spPr>
+          <p:txBody>
+            <a:bodyPr wrap="none" rtlCol="0">
+              <a:spAutoFit/>
+            </a:bodyPr>
+            <a:lstStyle/>
+            <a:p>
+              <a:r>
+                <a:rPr lang="de-CH" sz="1300" dirty="0" smtClean="0"/>
+                <a:t>Updated </a:t>
+              </a:r>
+              <a:r>
+                <a:rPr lang="de-CH" sz="1300" dirty="0" err="1" smtClean="0"/>
+                <a:t>Keypoint</a:t>
+              </a:r>
+              <a:r>
+                <a:rPr lang="de-CH" sz="1300" dirty="0" smtClean="0"/>
+                <a:t> </a:t>
+              </a:r>
+              <a:r>
+                <a:rPr lang="de-CH" sz="1300" dirty="0" err="1" smtClean="0"/>
+                <a:t>Tracker</a:t>
+              </a:r>
+              <a:endParaRPr lang="de-CH" sz="1300" dirty="0"/>
+            </a:p>
+          </p:txBody>
+        </p:sp>
+        <p:sp>
+          <p:nvSpPr>
+            <p:cNvPr id="93" name="TextBox 92"/>
+            <p:cNvSpPr txBox="1"/>
+            <p:nvPr/>
+          </p:nvSpPr>
+          <p:spPr>
+            <a:xfrm>
+              <a:off x="1375862" y="6325105"/>
+              <a:ext cx="1919949" cy="292388"/>
+            </a:xfrm>
+            <a:prstGeom prst="rect">
+              <a:avLst/>
+            </a:prstGeom>
+            <a:noFill/>
+          </p:spPr>
+          <p:txBody>
+            <a:bodyPr wrap="none" rtlCol="0">
+              <a:spAutoFit/>
+            </a:bodyPr>
+            <a:lstStyle/>
+            <a:p>
+              <a:r>
+                <a:rPr lang="de-CH" sz="1300" dirty="0" smtClean="0"/>
+                <a:t>Landmarks </a:t>
+              </a:r>
+              <a:r>
+                <a:rPr lang="de-CH" sz="1300" dirty="0" err="1" smtClean="0"/>
+                <a:t>and</a:t>
+              </a:r>
+              <a:r>
+                <a:rPr lang="de-CH" sz="1300" dirty="0" smtClean="0"/>
+                <a:t> </a:t>
+              </a:r>
+              <a:r>
+                <a:rPr lang="de-CH" sz="1300" dirty="0" err="1" smtClean="0"/>
+                <a:t>Keypoints</a:t>
+              </a:r>
+              <a:endParaRPr lang="de-CH" sz="1300" dirty="0"/>
+            </a:p>
+          </p:txBody>
+        </p:sp>
+        <p:cxnSp>
+          <p:nvCxnSpPr>
+            <p:cNvPr id="139" name="Straight Arrow Connector 138"/>
+            <p:cNvCxnSpPr/>
+            <p:nvPr/>
+          </p:nvCxnSpPr>
+          <p:spPr>
+            <a:xfrm>
+              <a:off x="4064006" y="5490154"/>
+              <a:ext cx="4006" cy="2848982"/>
+            </a:xfrm>
+            <a:prstGeom prst="straightConnector1">
+              <a:avLst/>
+            </a:prstGeom>
+            <a:ln w="9525">
+              <a:solidFill>
+                <a:schemeClr val="tx1"/>
+              </a:solidFill>
+              <a:tailEnd type="triangle"/>
+            </a:ln>
+          </p:spPr>
+          <p:style>
+            <a:lnRef idx="1">
+              <a:schemeClr val="accent1"/>
+            </a:lnRef>
+            <a:fillRef idx="0">
+              <a:schemeClr val="accent1"/>
+            </a:fillRef>
+            <a:effectRef idx="0">
+              <a:schemeClr val="accent1"/>
+            </a:effectRef>
+            <a:fontRef idx="minor">
+              <a:schemeClr val="tx1"/>
+            </a:fontRef>
+          </p:style>
+        </p:cxnSp>
+        <p:sp>
+          <p:nvSpPr>
+            <p:cNvPr id="141" name="TextBox 140"/>
+            <p:cNvSpPr txBox="1"/>
+            <p:nvPr/>
+          </p:nvSpPr>
+          <p:spPr>
+            <a:xfrm>
+              <a:off x="4037498" y="6325105"/>
+              <a:ext cx="1347741" cy="292388"/>
+            </a:xfrm>
+            <a:prstGeom prst="rect">
+              <a:avLst/>
+            </a:prstGeom>
+            <a:noFill/>
+          </p:spPr>
+          <p:txBody>
+            <a:bodyPr wrap="none" rtlCol="0">
+              <a:spAutoFit/>
+            </a:bodyPr>
+            <a:lstStyle/>
+            <a:p>
+              <a:r>
+                <a:rPr lang="de-CH" sz="1300" dirty="0" err="1" smtClean="0"/>
+                <a:t>Keypoint</a:t>
+              </a:r>
+              <a:r>
+                <a:rPr lang="de-CH" sz="1300" dirty="0" smtClean="0"/>
+                <a:t> </a:t>
+              </a:r>
+              <a:r>
+                <a:rPr lang="de-CH" sz="1300" dirty="0" err="1" smtClean="0"/>
+                <a:t>Tracker</a:t>
+              </a:r>
+              <a:endParaRPr lang="de-CH" sz="1300" dirty="0"/>
+            </a:p>
+          </p:txBody>
+        </p:sp>
+        <p:cxnSp>
+          <p:nvCxnSpPr>
+            <p:cNvPr id="20" name="Elbow Connector 19"/>
+            <p:cNvCxnSpPr>
+              <a:stCxn id="7" idx="3"/>
+            </p:cNvCxnSpPr>
+            <p:nvPr/>
+          </p:nvCxnSpPr>
+          <p:spPr>
+            <a:xfrm>
+              <a:off x="4341045" y="2435259"/>
+              <a:ext cx="259579" cy="1768903"/>
+            </a:xfrm>
+            <a:prstGeom prst="bentConnector2">
+              <a:avLst/>
+            </a:prstGeom>
+            <a:ln w="9525">
+              <a:solidFill>
+                <a:schemeClr val="tx1"/>
+              </a:solidFill>
+              <a:tailEnd type="triangle"/>
+            </a:ln>
+          </p:spPr>
+          <p:style>
+            <a:lnRef idx="1">
+              <a:schemeClr val="accent1"/>
+            </a:lnRef>
+            <a:fillRef idx="0">
+              <a:schemeClr val="accent1"/>
+            </a:fillRef>
+            <a:effectRef idx="0">
+              <a:schemeClr val="accent1"/>
+            </a:effectRef>
+            <a:fontRef idx="minor">
+              <a:schemeClr val="tx1"/>
+            </a:fontRef>
+          </p:style>
+        </p:cxnSp>
+        <p:sp>
+          <p:nvSpPr>
+            <p:cNvPr id="21" name="Rectangle 20"/>
+            <p:cNvSpPr/>
+            <p:nvPr/>
+          </p:nvSpPr>
+          <p:spPr>
+            <a:xfrm>
+              <a:off x="614363" y="1883043"/>
+              <a:ext cx="5127759" cy="5751245"/>
+            </a:xfrm>
+            <a:prstGeom prst="rect">
+              <a:avLst/>
+            </a:prstGeom>
+            <a:noFill/>
+            <a:ln w="25400">
+              <a:solidFill>
+                <a:schemeClr val="tx1"/>
+              </a:solidFill>
+              <a:prstDash val="dash"/>
+            </a:ln>
+          </p:spPr>
+          <p:style>
+            <a:lnRef idx="2">
+              <a:schemeClr val="accent1">
+                <a:shade val="50000"/>
+              </a:schemeClr>
+            </a:lnRef>
+            <a:fillRef idx="1">
+              <a:schemeClr val="accent1"/>
+            </a:fillRef>
+            <a:effectRef idx="0">
+              <a:schemeClr val="accent1"/>
+            </a:effectRef>
+            <a:fontRef idx="minor">
+              <a:schemeClr val="lt1"/>
+            </a:fontRef>
+          </p:style>
+          <p:txBody>
+            <a:bodyPr rtlCol="0" anchor="ctr"/>
+            <a:lstStyle/>
+            <a:p>
+              <a:pPr algn="ctr"/>
+              <a:endParaRPr lang="de-CH"/>
+            </a:p>
+          </p:txBody>
+        </p:sp>
+        <p:cxnSp>
+          <p:nvCxnSpPr>
+            <p:cNvPr id="38" name="Elbow Connector 37"/>
+            <p:cNvCxnSpPr>
+              <a:stCxn id="9" idx="1"/>
+            </p:cNvCxnSpPr>
+            <p:nvPr/>
+          </p:nvCxnSpPr>
+          <p:spPr>
+            <a:xfrm rot="10800000" flipV="1">
+              <a:off x="833633" y="3401150"/>
+              <a:ext cx="989922" cy="4937986"/>
+            </a:xfrm>
+            <a:prstGeom prst="bentConnector2">
+              <a:avLst/>
+            </a:prstGeom>
+            <a:ln w="9525">
+              <a:solidFill>
+                <a:schemeClr val="tx1"/>
+              </a:solidFill>
+              <a:tailEnd type="triangle"/>
+            </a:ln>
+          </p:spPr>
+          <p:style>
+            <a:lnRef idx="1">
+              <a:schemeClr val="accent1"/>
+            </a:lnRef>
+            <a:fillRef idx="0">
+              <a:schemeClr val="accent1"/>
+            </a:fillRef>
+            <a:effectRef idx="0">
+              <a:schemeClr val="accent1"/>
+            </a:effectRef>
+            <a:fontRef idx="minor">
+              <a:schemeClr val="tx1"/>
+            </a:fontRef>
+          </p:style>
+        </p:cxnSp>
+        <p:cxnSp>
+          <p:nvCxnSpPr>
+            <p:cNvPr id="66" name="Straight Connector 65"/>
+            <p:cNvCxnSpPr/>
+            <p:nvPr/>
+          </p:nvCxnSpPr>
+          <p:spPr>
+            <a:xfrm flipH="1">
+              <a:off x="307490" y="7891466"/>
+              <a:ext cx="1102558" cy="1"/>
+            </a:xfrm>
+            <a:prstGeom prst="line">
+              <a:avLst/>
+            </a:prstGeom>
+            <a:ln w="9525">
+              <a:solidFill>
+                <a:schemeClr val="tx1"/>
+              </a:solidFill>
+            </a:ln>
+          </p:spPr>
+          <p:style>
+            <a:lnRef idx="1">
+              <a:schemeClr val="accent1"/>
+            </a:lnRef>
+            <a:fillRef idx="0">
+              <a:schemeClr val="accent1"/>
+            </a:fillRef>
+            <a:effectRef idx="0">
+              <a:schemeClr val="accent1"/>
+            </a:effectRef>
+            <a:fontRef idx="minor">
+              <a:schemeClr val="tx1"/>
+            </a:fontRef>
+          </p:style>
+        </p:cxnSp>
+        <p:cxnSp>
+          <p:nvCxnSpPr>
+            <p:cNvPr id="69" name="Elbow Connector 68"/>
+            <p:cNvCxnSpPr/>
+            <p:nvPr/>
+          </p:nvCxnSpPr>
+          <p:spPr>
+            <a:xfrm rot="5400000" flipH="1" flipV="1">
+              <a:off x="-1743425" y="3469064"/>
+              <a:ext cx="6475702" cy="2369103"/>
+            </a:xfrm>
+            <a:prstGeom prst="bentConnector3">
+              <a:avLst>
+                <a:gd name="adj1" fmla="val 100010"/>
+              </a:avLst>
+            </a:prstGeom>
+            <a:ln w="9525">
+              <a:solidFill>
+                <a:schemeClr val="tx1"/>
+              </a:solidFill>
+              <a:tailEnd type="triangle"/>
+            </a:ln>
+          </p:spPr>
+          <p:style>
+            <a:lnRef idx="1">
+              <a:schemeClr val="accent1"/>
+            </a:lnRef>
+            <a:fillRef idx="0">
+              <a:schemeClr val="accent1"/>
+            </a:fillRef>
+            <a:effectRef idx="0">
+              <a:schemeClr val="accent1"/>
+            </a:effectRef>
+            <a:fontRef idx="minor">
+              <a:schemeClr val="tx1"/>
+            </a:fontRef>
+          </p:style>
+        </p:cxnSp>
+        <p:cxnSp>
+          <p:nvCxnSpPr>
+            <p:cNvPr id="76" name="Elbow Connector 75"/>
+            <p:cNvCxnSpPr/>
+            <p:nvPr/>
+          </p:nvCxnSpPr>
+          <p:spPr>
+            <a:xfrm rot="16200000" flipV="1">
+              <a:off x="2326122" y="4112058"/>
+              <a:ext cx="6480463" cy="1087871"/>
+            </a:xfrm>
+            <a:prstGeom prst="bentConnector3">
+              <a:avLst>
+                <a:gd name="adj1" fmla="val 99973"/>
+              </a:avLst>
+            </a:prstGeom>
+            <a:ln w="9525">
+              <a:solidFill>
+                <a:schemeClr val="tx1"/>
+              </a:solidFill>
+              <a:tailEnd type="triangle"/>
+            </a:ln>
+          </p:spPr>
+          <p:style>
+            <a:lnRef idx="1">
+              <a:schemeClr val="accent1"/>
+            </a:lnRef>
+            <a:fillRef idx="0">
+              <a:schemeClr val="accent1"/>
+            </a:fillRef>
+            <a:effectRef idx="0">
+              <a:schemeClr val="accent1"/>
+            </a:effectRef>
+            <a:fontRef idx="minor">
+              <a:schemeClr val="tx1"/>
+            </a:fontRef>
+          </p:style>
+        </p:cxnSp>
+        <p:cxnSp>
+          <p:nvCxnSpPr>
+            <p:cNvPr id="26" name="Elbow Connector 25"/>
+            <p:cNvCxnSpPr/>
+            <p:nvPr/>
+          </p:nvCxnSpPr>
+          <p:spPr>
+            <a:xfrm rot="16200000" flipH="1">
+              <a:off x="2795563" y="2176185"/>
+              <a:ext cx="2837084" cy="1227913"/>
+            </a:xfrm>
+            <a:prstGeom prst="bentConnector3">
+              <a:avLst>
+                <a:gd name="adj1" fmla="val 1571"/>
+              </a:avLst>
+            </a:prstGeom>
+            <a:ln w="9525">
+              <a:solidFill>
+                <a:schemeClr val="tx1"/>
+              </a:solidFill>
+              <a:tailEnd type="triangle"/>
+            </a:ln>
+          </p:spPr>
+          <p:style>
+            <a:lnRef idx="1">
+              <a:schemeClr val="accent1"/>
+            </a:lnRef>
+            <a:fillRef idx="0">
+              <a:schemeClr val="accent1"/>
+            </a:fillRef>
+            <a:effectRef idx="0">
+              <a:schemeClr val="accent1"/>
+            </a:effectRef>
+            <a:fontRef idx="minor">
+              <a:schemeClr val="tx1"/>
+            </a:fontRef>
+          </p:style>
+        </p:cxnSp>
+        <p:cxnSp>
+          <p:nvCxnSpPr>
+            <p:cNvPr id="34" name="Elbow Connector 33"/>
+            <p:cNvCxnSpPr>
+              <a:endCxn id="67" idx="0"/>
+            </p:cNvCxnSpPr>
+            <p:nvPr/>
+          </p:nvCxnSpPr>
+          <p:spPr>
+            <a:xfrm rot="5400000">
+              <a:off x="449431" y="4528644"/>
+              <a:ext cx="2575671" cy="648792"/>
+            </a:xfrm>
+            <a:prstGeom prst="bentConnector3">
+              <a:avLst>
+                <a:gd name="adj1" fmla="val 37519"/>
+              </a:avLst>
+            </a:prstGeom>
+            <a:ln w="9525">
+              <a:solidFill>
+                <a:schemeClr val="tx1"/>
+              </a:solidFill>
+              <a:tailEnd type="triangle"/>
+            </a:ln>
+          </p:spPr>
+          <p:style>
+            <a:lnRef idx="1">
+              <a:schemeClr val="accent1"/>
+            </a:lnRef>
+            <a:fillRef idx="0">
+              <a:schemeClr val="accent1"/>
+            </a:fillRef>
+            <a:effectRef idx="0">
+              <a:schemeClr val="accent1"/>
+            </a:effectRef>
+            <a:fontRef idx="minor">
+              <a:schemeClr val="tx1"/>
+            </a:fontRef>
+          </p:style>
+        </p:cxnSp>
+        <p:sp>
+          <p:nvSpPr>
+            <p:cNvPr id="55" name="TextBox 54"/>
+            <p:cNvSpPr txBox="1"/>
+            <p:nvPr/>
+          </p:nvSpPr>
+          <p:spPr>
+            <a:xfrm>
+              <a:off x="1356926" y="4540341"/>
+              <a:ext cx="1308435" cy="492443"/>
+            </a:xfrm>
+            <a:prstGeom prst="rect">
+              <a:avLst/>
+            </a:prstGeom>
+            <a:noFill/>
+          </p:spPr>
+          <p:txBody>
+            <a:bodyPr wrap="none" rtlCol="0">
+              <a:spAutoFit/>
+            </a:bodyPr>
+            <a:lstStyle/>
+            <a:p>
+              <a:r>
+                <a:rPr lang="de-CH" sz="1300" dirty="0" err="1" smtClean="0"/>
+                <a:t>Inlier</a:t>
+              </a:r>
+              <a:r>
+                <a:rPr lang="de-CH" sz="1300" dirty="0" smtClean="0"/>
+                <a:t> Landmarks</a:t>
+              </a:r>
+            </a:p>
+            <a:p>
+              <a:r>
+                <a:rPr lang="de-CH" sz="1300" dirty="0" err="1" smtClean="0"/>
+                <a:t>Inlier</a:t>
+              </a:r>
+              <a:r>
+                <a:rPr lang="de-CH" sz="1300" dirty="0" smtClean="0"/>
+                <a:t> </a:t>
+              </a:r>
+              <a:r>
+                <a:rPr lang="de-CH" sz="1300" dirty="0" err="1" smtClean="0"/>
+                <a:t>Keypoints</a:t>
+              </a:r>
+              <a:endParaRPr lang="de-CH" sz="1300" dirty="0"/>
+            </a:p>
+          </p:txBody>
+        </p:sp>
+        <p:cxnSp>
+          <p:nvCxnSpPr>
+            <p:cNvPr id="43" name="Elbow Connector 42"/>
+            <p:cNvCxnSpPr>
+              <a:endCxn id="67" idx="6"/>
+            </p:cNvCxnSpPr>
+            <p:nvPr/>
+          </p:nvCxnSpPr>
+          <p:spPr>
+            <a:xfrm rot="10800000" flipV="1">
+              <a:off x="1486737" y="5488781"/>
+              <a:ext cx="804025" cy="726122"/>
+            </a:xfrm>
+            <a:prstGeom prst="bentConnector3">
+              <a:avLst>
+                <a:gd name="adj1" fmla="val -3014"/>
+              </a:avLst>
+            </a:prstGeom>
+            <a:ln w="9525">
+              <a:solidFill>
+                <a:schemeClr val="tx1"/>
+              </a:solidFill>
+              <a:tailEnd type="triangle"/>
+            </a:ln>
+          </p:spPr>
+          <p:style>
+            <a:lnRef idx="1">
+              <a:schemeClr val="accent1"/>
+            </a:lnRef>
+            <a:fillRef idx="0">
+              <a:schemeClr val="accent1"/>
+            </a:fillRef>
+            <a:effectRef idx="0">
+              <a:schemeClr val="accent1"/>
+            </a:effectRef>
+            <a:fontRef idx="minor">
+              <a:schemeClr val="tx1"/>
+            </a:fontRef>
+          </p:style>
+        </p:cxnSp>
+        <p:sp>
+          <p:nvSpPr>
+            <p:cNvPr id="74" name="TextBox 73"/>
+            <p:cNvSpPr txBox="1"/>
+            <p:nvPr/>
+          </p:nvSpPr>
+          <p:spPr>
+            <a:xfrm>
+              <a:off x="2259304" y="5518235"/>
+              <a:ext cx="1269130" cy="530915"/>
+            </a:xfrm>
+            <a:prstGeom prst="rect">
+              <a:avLst/>
+            </a:prstGeom>
+            <a:noFill/>
+          </p:spPr>
+          <p:txBody>
+            <a:bodyPr wrap="none" rtlCol="0">
+              <a:spAutoFit/>
+            </a:bodyPr>
+            <a:lstStyle/>
+            <a:p>
+              <a:pPr>
+                <a:spcAft>
+                  <a:spcPts val="300"/>
+                </a:spcAft>
+              </a:pPr>
+              <a:r>
+                <a:rPr lang="de-CH" sz="1300" dirty="0" smtClean="0"/>
+                <a:t>New Landmarks</a:t>
+              </a:r>
+            </a:p>
+            <a:p>
+              <a:pPr>
+                <a:spcAft>
+                  <a:spcPts val="300"/>
+                </a:spcAft>
+              </a:pPr>
+              <a:r>
+                <a:rPr lang="de-CH" sz="1300" dirty="0" smtClean="0"/>
+                <a:t>New </a:t>
+              </a:r>
+              <a:r>
+                <a:rPr lang="de-CH" sz="1300" dirty="0" err="1" smtClean="0"/>
+                <a:t>Keypoints</a:t>
+              </a:r>
+              <a:endParaRPr lang="de-CH" sz="1300" dirty="0"/>
+            </a:p>
+          </p:txBody>
+        </p:sp>
+        <p:sp>
+          <p:nvSpPr>
+            <p:cNvPr id="67" name="Oval 66"/>
+            <p:cNvSpPr/>
+            <p:nvPr/>
+          </p:nvSpPr>
+          <p:spPr>
+            <a:xfrm>
+              <a:off x="1339003" y="6140876"/>
+              <a:ext cx="147733" cy="148053"/>
+            </a:xfrm>
+            <a:prstGeom prst="ellipse">
+              <a:avLst/>
+            </a:prstGeom>
+            <a:noFill/>
+            <a:ln>
+              <a:solidFill>
+                <a:schemeClr val="tx1"/>
+              </a:solidFill>
+            </a:ln>
+          </p:spPr>
+          <p:style>
+            <a:lnRef idx="2">
+              <a:schemeClr val="accent1">
+                <a:shade val="50000"/>
+              </a:schemeClr>
+            </a:lnRef>
+            <a:fillRef idx="1">
+              <a:schemeClr val="accent1"/>
+            </a:fillRef>
+            <a:effectRef idx="0">
+              <a:schemeClr val="accent1"/>
+            </a:effectRef>
+            <a:fontRef idx="minor">
+              <a:schemeClr val="lt1"/>
+            </a:fontRef>
+          </p:style>
+          <p:txBody>
+            <a:bodyPr rtlCol="0" anchor="ctr"/>
+            <a:lstStyle/>
+            <a:p>
+              <a:pPr algn="ctr"/>
+              <a:r>
+                <a:rPr lang="de-CH" dirty="0"/>
+                <a:t>+</a:t>
+              </a:r>
+            </a:p>
+          </p:txBody>
+        </p:sp>
+        <p:sp>
+          <p:nvSpPr>
+            <p:cNvPr id="87" name="Rectangle 86"/>
+            <p:cNvSpPr/>
+            <p:nvPr/>
+          </p:nvSpPr>
+          <p:spPr>
+            <a:xfrm>
+              <a:off x="956956" y="6716874"/>
+              <a:ext cx="2527093" cy="323350"/>
+            </a:xfrm>
+            <a:prstGeom prst="rect">
+              <a:avLst/>
+            </a:prstGeom>
+            <a:noFill/>
+            <a:ln w="12700">
+              <a:solidFill>
+                <a:schemeClr val="tx1"/>
+              </a:solidFill>
+            </a:ln>
+          </p:spPr>
+          <p:style>
+            <a:lnRef idx="2">
+              <a:schemeClr val="accent1">
+                <a:shade val="50000"/>
+              </a:schemeClr>
+            </a:lnRef>
+            <a:fillRef idx="1">
+              <a:schemeClr val="accent1"/>
+            </a:fillRef>
+            <a:effectRef idx="0">
+              <a:schemeClr val="accent1"/>
+            </a:effectRef>
+            <a:fontRef idx="minor">
+              <a:schemeClr val="lt1"/>
+            </a:fontRef>
+          </p:style>
+          <p:txBody>
+            <a:bodyPr rot="0" spcFirstLastPara="0" vertOverflow="overflow" horzOverflow="overflow" vert="horz" wrap="square" lIns="132080" tIns="66041" rIns="132080" bIns="66041" numCol="1" spcCol="0" rtlCol="0" fromWordArt="0" anchor="ctr" anchorCtr="0" forceAA="0" compatLnSpc="1">
+              <a:prstTxWarp prst="textNoShape">
+                <a:avLst/>
+              </a:prstTxWarp>
+              <a:noAutofit/>
+            </a:bodyPr>
+            <a:lstStyle/>
+            <a:p>
+              <a:pPr algn="ctr"/>
+              <a:r>
+                <a:rPr lang="de-CH" sz="1518" dirty="0" err="1" smtClean="0">
+                  <a:solidFill>
+                    <a:schemeClr val="tx1"/>
+                  </a:solidFill>
+                </a:rPr>
+                <a:t>bundleAdjustement</a:t>
+              </a:r>
+              <a:r>
+                <a:rPr lang="de-CH" sz="1518" dirty="0" smtClean="0">
+                  <a:solidFill>
+                    <a:schemeClr val="tx1"/>
+                  </a:solidFill>
+                </a:rPr>
+                <a:t>()</a:t>
+              </a:r>
+              <a:endParaRPr lang="de-CH" sz="2601" dirty="0">
                 <a:solidFill>
                   <a:schemeClr val="tx1"/>
                 </a:solidFill>
-              </a:rPr>
-              <a:t>updateKpTracks</a:t>
-            </a:r>
-            <a:r>
-              <a:rPr lang="de-CH" sz="1518" dirty="0" smtClean="0">
-                <a:solidFill>
-                  <a:schemeClr val="tx1"/>
-                </a:solidFill>
-              </a:rPr>
-              <a:t>()</a:t>
-            </a:r>
-            <a:endParaRPr lang="de-CH" sz="2601" dirty="0">
+              </a:endParaRPr>
+            </a:p>
+          </p:txBody>
+        </p:sp>
+        <p:cxnSp>
+          <p:nvCxnSpPr>
+            <p:cNvPr id="99" name="Straight Arrow Connector 98"/>
+            <p:cNvCxnSpPr>
+              <a:stCxn id="67" idx="4"/>
+            </p:cNvCxnSpPr>
+            <p:nvPr/>
+          </p:nvCxnSpPr>
+          <p:spPr>
+            <a:xfrm flipH="1">
+              <a:off x="1412869" y="6288929"/>
+              <a:ext cx="1" cy="427945"/>
+            </a:xfrm>
+            <a:prstGeom prst="straightConnector1">
+              <a:avLst/>
+            </a:prstGeom>
+            <a:ln w="9525">
               <a:solidFill>
                 <a:schemeClr val="tx1"/>
               </a:solidFill>
-            </a:endParaRPr>
-          </a:p>
-        </p:txBody>
-      </p:sp>
-      <p:cxnSp>
-        <p:nvCxnSpPr>
-          <p:cNvPr id="16" name="Straight Arrow Connector 15"/>
-          <p:cNvCxnSpPr/>
-          <p:nvPr/>
-        </p:nvCxnSpPr>
-        <p:spPr>
-          <a:xfrm>
-            <a:off x="2678979" y="557939"/>
-            <a:ext cx="229" cy="1720682"/>
-          </a:xfrm>
-          <a:prstGeom prst="straightConnector1">
-            <a:avLst/>
-          </a:prstGeom>
-          <a:ln w="9525">
-            <a:solidFill>
+              <a:tailEnd type="triangle"/>
+            </a:ln>
+          </p:spPr>
+          <p:style>
+            <a:lnRef idx="1">
+              <a:schemeClr val="accent1"/>
+            </a:lnRef>
+            <a:fillRef idx="0">
+              <a:schemeClr val="accent1"/>
+            </a:fillRef>
+            <a:effectRef idx="0">
+              <a:schemeClr val="accent1"/>
+            </a:effectRef>
+            <a:fontRef idx="minor">
               <a:schemeClr val="tx1"/>
-            </a:solidFill>
-            <a:tailEnd type="triangle"/>
-          </a:ln>
-        </p:spPr>
-        <p:style>
-          <a:lnRef idx="1">
-            <a:schemeClr val="accent1"/>
-          </a:lnRef>
-          <a:fillRef idx="0">
-            <a:schemeClr val="accent1"/>
-          </a:fillRef>
-          <a:effectRef idx="0">
-            <a:schemeClr val="accent1"/>
-          </a:effectRef>
-          <a:fontRef idx="minor">
-            <a:schemeClr val="tx1"/>
-          </a:fontRef>
-        </p:style>
-      </p:cxnSp>
-      <p:cxnSp>
-        <p:nvCxnSpPr>
-          <p:cNvPr id="19" name="Straight Arrow Connector 18"/>
-          <p:cNvCxnSpPr/>
-          <p:nvPr/>
-        </p:nvCxnSpPr>
-        <p:spPr>
-          <a:xfrm>
-            <a:off x="3600149" y="557939"/>
-            <a:ext cx="0" cy="1715645"/>
-          </a:xfrm>
-          <a:prstGeom prst="straightConnector1">
-            <a:avLst/>
-          </a:prstGeom>
-          <a:ln w="9525">
-            <a:solidFill>
-              <a:schemeClr val="tx1"/>
-            </a:solidFill>
-            <a:tailEnd type="triangle"/>
-          </a:ln>
-        </p:spPr>
-        <p:style>
-          <a:lnRef idx="1">
-            <a:schemeClr val="accent1"/>
-          </a:lnRef>
-          <a:fillRef idx="0">
-            <a:schemeClr val="accent1"/>
-          </a:fillRef>
-          <a:effectRef idx="0">
-            <a:schemeClr val="accent1"/>
-          </a:effectRef>
-          <a:fontRef idx="minor">
-            <a:schemeClr val="tx1"/>
-          </a:fontRef>
-        </p:style>
-      </p:cxnSp>
-      <p:sp>
-        <p:nvSpPr>
-          <p:cNvPr id="23" name="TextBox 22"/>
-          <p:cNvSpPr txBox="1"/>
-          <p:nvPr/>
-        </p:nvSpPr>
-        <p:spPr>
-          <a:xfrm>
-            <a:off x="1348345" y="556292"/>
-            <a:ext cx="1342099" cy="692497"/>
-          </a:xfrm>
-          <a:prstGeom prst="rect">
-            <a:avLst/>
-          </a:prstGeom>
-          <a:noFill/>
-        </p:spPr>
-        <p:txBody>
-          <a:bodyPr wrap="none" rtlCol="0">
-            <a:spAutoFit/>
-          </a:bodyPr>
-          <a:lstStyle/>
-          <a:p>
-            <a:pPr algn="r"/>
-            <a:r>
-              <a:rPr lang="de-CH" sz="1300" dirty="0" smtClean="0"/>
-              <a:t>Initial </a:t>
-            </a:r>
-            <a:r>
-              <a:rPr lang="de-CH" sz="1300" dirty="0" smtClean="0"/>
-              <a:t>Pose</a:t>
-            </a:r>
-            <a:endParaRPr lang="de-CH" sz="1300" dirty="0" smtClean="0"/>
-          </a:p>
-          <a:p>
-            <a:pPr algn="r"/>
-            <a:r>
-              <a:rPr lang="de-CH" sz="1300" dirty="0" smtClean="0"/>
-              <a:t>Initial </a:t>
-            </a:r>
-            <a:r>
-              <a:rPr lang="de-CH" sz="1300" dirty="0" err="1" smtClean="0"/>
-              <a:t>Keypoints</a:t>
-            </a:r>
-            <a:endParaRPr lang="de-CH" sz="1300" dirty="0"/>
-          </a:p>
-          <a:p>
-            <a:pPr algn="r"/>
-            <a:r>
-              <a:rPr lang="de-CH" sz="1300" dirty="0" smtClean="0"/>
-              <a:t>Initial Landmarks</a:t>
-            </a:r>
-          </a:p>
-        </p:txBody>
-      </p:sp>
-      <p:cxnSp>
-        <p:nvCxnSpPr>
-          <p:cNvPr id="30" name="Straight Arrow Connector 29"/>
-          <p:cNvCxnSpPr>
-            <a:stCxn id="7" idx="2"/>
-            <a:endCxn id="9" idx="0"/>
-          </p:cNvCxnSpPr>
-          <p:nvPr/>
-        </p:nvCxnSpPr>
-        <p:spPr>
-          <a:xfrm>
-            <a:off x="3082300" y="2596934"/>
-            <a:ext cx="0" cy="642541"/>
-          </a:xfrm>
-          <a:prstGeom prst="straightConnector1">
-            <a:avLst/>
-          </a:prstGeom>
-          <a:ln w="9525">
-            <a:solidFill>
-              <a:schemeClr val="tx1"/>
-            </a:solidFill>
-            <a:tailEnd type="triangle"/>
-          </a:ln>
-        </p:spPr>
-        <p:style>
-          <a:lnRef idx="1">
-            <a:schemeClr val="accent1"/>
-          </a:lnRef>
-          <a:fillRef idx="0">
-            <a:schemeClr val="accent1"/>
-          </a:fillRef>
-          <a:effectRef idx="0">
-            <a:schemeClr val="accent1"/>
-          </a:effectRef>
-          <a:fontRef idx="minor">
-            <a:schemeClr val="tx1"/>
-          </a:fontRef>
-        </p:style>
-      </p:cxnSp>
-      <p:sp>
-        <p:nvSpPr>
-          <p:cNvPr id="31" name="TextBox 30"/>
-          <p:cNvSpPr txBox="1"/>
-          <p:nvPr/>
-        </p:nvSpPr>
-        <p:spPr>
-          <a:xfrm>
-            <a:off x="1579034" y="2758753"/>
-            <a:ext cx="1526765" cy="292388"/>
-          </a:xfrm>
-          <a:prstGeom prst="rect">
-            <a:avLst/>
-          </a:prstGeom>
-          <a:noFill/>
-        </p:spPr>
-        <p:txBody>
-          <a:bodyPr wrap="none" rtlCol="0">
-            <a:spAutoFit/>
-          </a:bodyPr>
-          <a:lstStyle/>
-          <a:p>
-            <a:r>
-              <a:rPr lang="de-CH" sz="1300" dirty="0" err="1" smtClean="0"/>
-              <a:t>Matching</a:t>
-            </a:r>
-            <a:r>
-              <a:rPr lang="de-CH" sz="1300" dirty="0" smtClean="0"/>
-              <a:t> </a:t>
-            </a:r>
-            <a:r>
-              <a:rPr lang="de-CH" sz="1300" dirty="0" err="1" smtClean="0"/>
-              <a:t>Keypoints</a:t>
-            </a:r>
-            <a:endParaRPr lang="de-CH" sz="1300" dirty="0"/>
-          </a:p>
-        </p:txBody>
-      </p:sp>
-      <p:sp>
-        <p:nvSpPr>
-          <p:cNvPr id="2" name="TextBox 1"/>
-          <p:cNvSpPr txBox="1"/>
-          <p:nvPr/>
-        </p:nvSpPr>
-        <p:spPr>
-          <a:xfrm>
-            <a:off x="5022371" y="556292"/>
-            <a:ext cx="1729256" cy="292388"/>
-          </a:xfrm>
-          <a:prstGeom prst="rect">
-            <a:avLst/>
-          </a:prstGeom>
-          <a:noFill/>
-        </p:spPr>
-        <p:txBody>
-          <a:bodyPr wrap="none" rtlCol="0">
-            <a:spAutoFit/>
-          </a:bodyPr>
-          <a:lstStyle/>
-          <a:p>
-            <a:r>
-              <a:rPr lang="de-CH" sz="1300" dirty="0" smtClean="0"/>
-              <a:t>Initial </a:t>
-            </a:r>
-            <a:r>
-              <a:rPr lang="de-CH" sz="1300" dirty="0" err="1" smtClean="0"/>
-              <a:t>Keypoint</a:t>
-            </a:r>
-            <a:r>
-              <a:rPr lang="de-CH" sz="1300" dirty="0" smtClean="0"/>
-              <a:t> </a:t>
-            </a:r>
-            <a:r>
-              <a:rPr lang="de-CH" sz="1300" dirty="0" err="1" smtClean="0"/>
-              <a:t>Tracker</a:t>
-            </a:r>
-            <a:endParaRPr lang="de-CH" sz="1300" dirty="0"/>
-          </a:p>
-        </p:txBody>
-      </p:sp>
-      <p:sp>
-        <p:nvSpPr>
-          <p:cNvPr id="29" name="Rectangle 28"/>
-          <p:cNvSpPr/>
-          <p:nvPr/>
-        </p:nvSpPr>
-        <p:spPr>
-          <a:xfrm>
-            <a:off x="1823554" y="5162282"/>
-            <a:ext cx="2527093" cy="323350"/>
-          </a:xfrm>
-          <a:prstGeom prst="rect">
-            <a:avLst/>
-          </a:prstGeom>
-          <a:noFill/>
-          <a:ln w="12700">
-            <a:solidFill>
-              <a:schemeClr val="tx1"/>
-            </a:solidFill>
-          </a:ln>
-        </p:spPr>
-        <p:style>
-          <a:lnRef idx="2">
-            <a:schemeClr val="accent1">
-              <a:shade val="50000"/>
-            </a:schemeClr>
-          </a:lnRef>
-          <a:fillRef idx="1">
-            <a:schemeClr val="accent1"/>
-          </a:fillRef>
-          <a:effectRef idx="0">
-            <a:schemeClr val="accent1"/>
-          </a:effectRef>
-          <a:fontRef idx="minor">
-            <a:schemeClr val="lt1"/>
-          </a:fontRef>
-        </p:style>
-        <p:txBody>
-          <a:bodyPr rot="0" spcFirstLastPara="0" vertOverflow="overflow" horzOverflow="overflow" vert="horz" wrap="square" lIns="132080" tIns="66041" rIns="132080" bIns="66041" numCol="1" spcCol="0" rtlCol="0" fromWordArt="0" anchor="ctr" anchorCtr="0" forceAA="0" compatLnSpc="1">
-            <a:prstTxWarp prst="textNoShape">
+            </a:fontRef>
+          </p:style>
+        </p:cxnSp>
+        <p:sp>
+          <p:nvSpPr>
+            <p:cNvPr id="104" name="Rectangle 103"/>
+            <p:cNvSpPr/>
+            <p:nvPr/>
+          </p:nvSpPr>
+          <p:spPr>
+            <a:xfrm>
+              <a:off x="614362" y="8104230"/>
+              <a:ext cx="5127759" cy="533439"/>
+            </a:xfrm>
+            <a:prstGeom prst="rect">
               <a:avLst/>
-            </a:prstTxWarp>
-            <a:noAutofit/>
-          </a:bodyPr>
-          <a:lstStyle/>
-          <a:p>
-            <a:pPr algn="ctr"/>
-            <a:r>
-              <a:rPr lang="de-CH" sz="1518" dirty="0" err="1" smtClean="0">
-                <a:solidFill>
-                  <a:schemeClr val="tx1"/>
-                </a:solidFill>
-              </a:rPr>
-              <a:t>triangulateNewLandmarks</a:t>
-            </a:r>
-            <a:r>
-              <a:rPr lang="de-CH" sz="1518" dirty="0" smtClean="0">
-                <a:solidFill>
-                  <a:schemeClr val="tx1"/>
-                </a:solidFill>
-              </a:rPr>
-              <a:t>()</a:t>
-            </a:r>
-            <a:endParaRPr lang="de-CH" sz="2601" dirty="0">
+            </a:prstGeom>
+            <a:noFill/>
+            <a:ln w="25400">
               <a:solidFill>
                 <a:schemeClr val="tx1"/>
               </a:solidFill>
-            </a:endParaRPr>
-          </a:p>
-        </p:txBody>
-      </p:sp>
-      <p:sp>
-        <p:nvSpPr>
-          <p:cNvPr id="47" name="TextBox 46"/>
-          <p:cNvSpPr txBox="1"/>
-          <p:nvPr/>
-        </p:nvSpPr>
-        <p:spPr>
-          <a:xfrm>
-            <a:off x="3527546" y="2757493"/>
-            <a:ext cx="1154162" cy="292388"/>
-          </a:xfrm>
-          <a:prstGeom prst="rect">
-            <a:avLst/>
-          </a:prstGeom>
-          <a:noFill/>
-        </p:spPr>
-        <p:txBody>
-          <a:bodyPr wrap="none" rtlCol="0">
-            <a:spAutoFit/>
-          </a:bodyPr>
-          <a:lstStyle/>
-          <a:p>
-            <a:r>
-              <a:rPr lang="de-CH" sz="1300" dirty="0" err="1" smtClean="0"/>
-              <a:t>Current</a:t>
-            </a:r>
-            <a:r>
-              <a:rPr lang="de-CH" sz="1300" dirty="0" smtClean="0"/>
-              <a:t> Image</a:t>
-            </a:r>
-            <a:endParaRPr lang="de-CH" sz="1300" dirty="0"/>
-          </a:p>
-        </p:txBody>
-      </p:sp>
-      <p:cxnSp>
-        <p:nvCxnSpPr>
-          <p:cNvPr id="52" name="Straight Arrow Connector 51"/>
-          <p:cNvCxnSpPr/>
-          <p:nvPr/>
-        </p:nvCxnSpPr>
-        <p:spPr>
-          <a:xfrm flipH="1">
-            <a:off x="2395065" y="3562825"/>
-            <a:ext cx="570" cy="1598199"/>
-          </a:xfrm>
-          <a:prstGeom prst="straightConnector1">
-            <a:avLst/>
-          </a:prstGeom>
-          <a:ln w="9525">
-            <a:solidFill>
+              <a:prstDash val="dash"/>
+            </a:ln>
+          </p:spPr>
+          <p:style>
+            <a:lnRef idx="2">
+              <a:schemeClr val="accent1">
+                <a:shade val="50000"/>
+              </a:schemeClr>
+            </a:lnRef>
+            <a:fillRef idx="1">
+              <a:schemeClr val="accent1"/>
+            </a:fillRef>
+            <a:effectRef idx="0">
+              <a:schemeClr val="accent1"/>
+            </a:effectRef>
+            <a:fontRef idx="minor">
+              <a:schemeClr val="lt1"/>
+            </a:fontRef>
+          </p:style>
+          <p:txBody>
+            <a:bodyPr rtlCol="0" anchor="ctr"/>
+            <a:lstStyle/>
+            <a:p>
+              <a:pPr algn="ctr"/>
+              <a:endParaRPr lang="de-CH"/>
+            </a:p>
+          </p:txBody>
+        </p:sp>
+        <p:sp>
+          <p:nvSpPr>
+            <p:cNvPr id="102" name="TextBox 101"/>
+            <p:cNvSpPr txBox="1"/>
+            <p:nvPr/>
+          </p:nvSpPr>
+          <p:spPr>
+            <a:xfrm>
+              <a:off x="2994844" y="8186283"/>
+              <a:ext cx="513282" cy="369332"/>
+            </a:xfrm>
+            <a:prstGeom prst="rect">
+              <a:avLst/>
+            </a:prstGeom>
+            <a:noFill/>
+          </p:spPr>
+          <p:txBody>
+            <a:bodyPr wrap="none" rtlCol="0">
+              <a:spAutoFit/>
+            </a:bodyPr>
+            <a:lstStyle/>
+            <a:p>
+              <a:r>
+                <a:rPr lang="de-CH" dirty="0" smtClean="0"/>
+                <a:t>Log</a:t>
+              </a:r>
+              <a:endParaRPr lang="de-CH" dirty="0"/>
+            </a:p>
+          </p:txBody>
+        </p:sp>
+        <p:sp>
+          <p:nvSpPr>
+            <p:cNvPr id="108" name="TextBox 107"/>
+            <p:cNvSpPr txBox="1"/>
+            <p:nvPr/>
+          </p:nvSpPr>
+          <p:spPr>
+            <a:xfrm>
+              <a:off x="786443" y="3675496"/>
+              <a:ext cx="625299" cy="292388"/>
+            </a:xfrm>
+            <a:prstGeom prst="rect">
+              <a:avLst/>
+            </a:prstGeom>
+            <a:noFill/>
+          </p:spPr>
+          <p:txBody>
+            <a:bodyPr wrap="none" rtlCol="0">
+              <a:spAutoFit/>
+            </a:bodyPr>
+            <a:lstStyle/>
+            <a:p>
+              <a:r>
+                <a:rPr lang="de-CH" sz="1300" dirty="0" err="1"/>
+                <a:t>T_WCj</a:t>
+              </a:r>
+              <a:endParaRPr lang="de-CH" sz="1300" dirty="0"/>
+            </a:p>
+          </p:txBody>
+        </p:sp>
+        <p:cxnSp>
+          <p:nvCxnSpPr>
+            <p:cNvPr id="109" name="Straight Arrow Connector 108"/>
+            <p:cNvCxnSpPr/>
+            <p:nvPr/>
+          </p:nvCxnSpPr>
+          <p:spPr>
+            <a:xfrm>
+              <a:off x="1410047" y="7040224"/>
+              <a:ext cx="0" cy="1298912"/>
+            </a:xfrm>
+            <a:prstGeom prst="straightConnector1">
+              <a:avLst/>
+            </a:prstGeom>
+            <a:ln w="9525">
+              <a:solidFill>
+                <a:schemeClr val="tx1"/>
+              </a:solidFill>
+              <a:tailEnd type="triangle"/>
+            </a:ln>
+          </p:spPr>
+          <p:style>
+            <a:lnRef idx="1">
+              <a:schemeClr val="accent1"/>
+            </a:lnRef>
+            <a:fillRef idx="0">
+              <a:schemeClr val="accent1"/>
+            </a:fillRef>
+            <a:effectRef idx="0">
+              <a:schemeClr val="accent1"/>
+            </a:effectRef>
+            <a:fontRef idx="minor">
               <a:schemeClr val="tx1"/>
-            </a:solidFill>
-            <a:tailEnd type="triangle"/>
-          </a:ln>
-        </p:spPr>
-        <p:style>
-          <a:lnRef idx="1">
-            <a:schemeClr val="accent1"/>
-          </a:lnRef>
-          <a:fillRef idx="0">
-            <a:schemeClr val="accent1"/>
-          </a:fillRef>
-          <a:effectRef idx="0">
-            <a:schemeClr val="accent1"/>
-          </a:effectRef>
-          <a:fontRef idx="minor">
-            <a:schemeClr val="tx1"/>
-          </a:fontRef>
-        </p:style>
-      </p:cxnSp>
-      <p:cxnSp>
-        <p:nvCxnSpPr>
-          <p:cNvPr id="54" name="Elbow Connector 53"/>
-          <p:cNvCxnSpPr/>
-          <p:nvPr/>
-        </p:nvCxnSpPr>
-        <p:spPr>
-          <a:xfrm>
-            <a:off x="2392440" y="3997031"/>
-            <a:ext cx="799316" cy="207131"/>
-          </a:xfrm>
-          <a:prstGeom prst="bentConnector3">
-            <a:avLst>
-              <a:gd name="adj1" fmla="val 100049"/>
-            </a:avLst>
-          </a:prstGeom>
-          <a:ln w="9525">
-            <a:solidFill>
+            </a:fontRef>
+          </p:style>
+        </p:cxnSp>
+        <p:sp>
+          <p:nvSpPr>
+            <p:cNvPr id="113" name="TextBox 112"/>
+            <p:cNvSpPr txBox="1"/>
+            <p:nvPr/>
+          </p:nvSpPr>
+          <p:spPr>
+            <a:xfrm>
+              <a:off x="1351060" y="7142194"/>
+              <a:ext cx="2560701" cy="292388"/>
+            </a:xfrm>
+            <a:prstGeom prst="rect">
+              <a:avLst/>
+            </a:prstGeom>
+            <a:noFill/>
+          </p:spPr>
+          <p:txBody>
+            <a:bodyPr wrap="none" rtlCol="0">
+              <a:spAutoFit/>
+            </a:bodyPr>
+            <a:lstStyle/>
+            <a:p>
+              <a:r>
+                <a:rPr lang="de-CH" sz="1300" dirty="0" err="1" smtClean="0"/>
+                <a:t>Adjusted</a:t>
+              </a:r>
+              <a:r>
+                <a:rPr lang="de-CH" sz="1300" dirty="0" smtClean="0"/>
+                <a:t> </a:t>
+              </a:r>
+              <a:r>
+                <a:rPr lang="de-CH" sz="1300" dirty="0" smtClean="0"/>
+                <a:t>Landmarks </a:t>
+              </a:r>
+              <a:r>
+                <a:rPr lang="de-CH" sz="1300" dirty="0" err="1" smtClean="0"/>
+                <a:t>and</a:t>
+              </a:r>
+              <a:r>
+                <a:rPr lang="de-CH" sz="1300" dirty="0" smtClean="0"/>
+                <a:t> </a:t>
+              </a:r>
+              <a:r>
+                <a:rPr lang="de-CH" sz="1300" dirty="0" err="1" smtClean="0"/>
+                <a:t>Keypoints</a:t>
+              </a:r>
+              <a:endParaRPr lang="de-CH" sz="1300" dirty="0"/>
+            </a:p>
+          </p:txBody>
+        </p:sp>
+        <p:cxnSp>
+          <p:nvCxnSpPr>
+            <p:cNvPr id="120" name="Straight Connector 119"/>
+            <p:cNvCxnSpPr/>
+            <p:nvPr/>
+          </p:nvCxnSpPr>
+          <p:spPr>
+            <a:xfrm flipH="1">
+              <a:off x="4064006" y="7893284"/>
+              <a:ext cx="2043900" cy="0"/>
+            </a:xfrm>
+            <a:prstGeom prst="line">
+              <a:avLst/>
+            </a:prstGeom>
+            <a:ln w="9525">
+              <a:solidFill>
+                <a:schemeClr val="tx1"/>
+              </a:solidFill>
+            </a:ln>
+          </p:spPr>
+          <p:style>
+            <a:lnRef idx="1">
+              <a:schemeClr val="accent1"/>
+            </a:lnRef>
+            <a:fillRef idx="0">
+              <a:schemeClr val="accent1"/>
+            </a:fillRef>
+            <a:effectRef idx="0">
+              <a:schemeClr val="accent1"/>
+            </a:effectRef>
+            <a:fontRef idx="minor">
               <a:schemeClr val="tx1"/>
-            </a:solidFill>
-            <a:tailEnd type="triangle"/>
-          </a:ln>
-        </p:spPr>
-        <p:style>
-          <a:lnRef idx="1">
-            <a:schemeClr val="accent1"/>
-          </a:lnRef>
-          <a:fillRef idx="0">
-            <a:schemeClr val="accent1"/>
-          </a:fillRef>
-          <a:effectRef idx="0">
-            <a:schemeClr val="accent1"/>
-          </a:effectRef>
-          <a:fontRef idx="minor">
-            <a:schemeClr val="tx1"/>
-          </a:fontRef>
-        </p:style>
-      </p:cxnSp>
-      <p:sp>
-        <p:nvSpPr>
-          <p:cNvPr id="58" name="TextBox 57"/>
-          <p:cNvSpPr txBox="1"/>
-          <p:nvPr/>
-        </p:nvSpPr>
-        <p:spPr>
-          <a:xfrm>
-            <a:off x="2381033" y="3647105"/>
-            <a:ext cx="505138" cy="292388"/>
-          </a:xfrm>
-          <a:prstGeom prst="rect">
-            <a:avLst/>
-          </a:prstGeom>
-          <a:noFill/>
-        </p:spPr>
-        <p:txBody>
-          <a:bodyPr wrap="none" rtlCol="0">
-            <a:spAutoFit/>
-          </a:bodyPr>
-          <a:lstStyle/>
-          <a:p>
-            <a:r>
-              <a:rPr lang="de-CH" sz="1300" dirty="0" smtClean="0"/>
-              <a:t>Pose</a:t>
-            </a:r>
-            <a:endParaRPr lang="de-CH" sz="1300" dirty="0"/>
-          </a:p>
-        </p:txBody>
-      </p:sp>
-      <p:cxnSp>
-        <p:nvCxnSpPr>
-          <p:cNvPr id="62" name="Straight Arrow Connector 61"/>
-          <p:cNvCxnSpPr/>
-          <p:nvPr/>
-        </p:nvCxnSpPr>
-        <p:spPr>
-          <a:xfrm>
-            <a:off x="5022371" y="557939"/>
-            <a:ext cx="0" cy="3646223"/>
-          </a:xfrm>
-          <a:prstGeom prst="straightConnector1">
-            <a:avLst/>
-          </a:prstGeom>
-          <a:ln w="9525">
-            <a:solidFill>
-              <a:schemeClr val="tx1"/>
-            </a:solidFill>
-            <a:tailEnd type="triangle"/>
-          </a:ln>
-        </p:spPr>
-        <p:style>
-          <a:lnRef idx="1">
-            <a:schemeClr val="accent1"/>
-          </a:lnRef>
-          <a:fillRef idx="0">
-            <a:schemeClr val="accent1"/>
-          </a:fillRef>
-          <a:effectRef idx="0">
-            <a:schemeClr val="accent1"/>
-          </a:effectRef>
-          <a:fontRef idx="minor">
-            <a:schemeClr val="tx1"/>
-          </a:fontRef>
-        </p:style>
-      </p:cxnSp>
-      <p:sp>
-        <p:nvSpPr>
-          <p:cNvPr id="64" name="TextBox 63"/>
-          <p:cNvSpPr txBox="1"/>
-          <p:nvPr/>
-        </p:nvSpPr>
-        <p:spPr>
-          <a:xfrm>
-            <a:off x="3611385" y="561918"/>
-            <a:ext cx="1218988" cy="492443"/>
-          </a:xfrm>
-          <a:prstGeom prst="rect">
-            <a:avLst/>
-          </a:prstGeom>
-          <a:noFill/>
-        </p:spPr>
-        <p:txBody>
-          <a:bodyPr wrap="none" rtlCol="0">
-            <a:spAutoFit/>
-          </a:bodyPr>
-          <a:lstStyle/>
-          <a:p>
-            <a:r>
-              <a:rPr lang="de-CH" sz="1300" dirty="0" err="1" smtClean="0"/>
-              <a:t>Current</a:t>
-            </a:r>
-            <a:r>
-              <a:rPr lang="de-CH" sz="1300" dirty="0" smtClean="0"/>
-              <a:t> Image</a:t>
-            </a:r>
-          </a:p>
-          <a:p>
-            <a:r>
-              <a:rPr lang="de-CH" sz="1300" dirty="0" err="1" smtClean="0"/>
-              <a:t>Previous</a:t>
-            </a:r>
-            <a:r>
-              <a:rPr lang="de-CH" sz="1300" dirty="0" smtClean="0"/>
-              <a:t> Image</a:t>
-            </a:r>
-            <a:endParaRPr lang="de-CH" sz="1300" dirty="0"/>
-          </a:p>
-        </p:txBody>
-      </p:sp>
-      <p:cxnSp>
-        <p:nvCxnSpPr>
-          <p:cNvPr id="71" name="Straight Arrow Connector 70"/>
-          <p:cNvCxnSpPr/>
-          <p:nvPr/>
-        </p:nvCxnSpPr>
-        <p:spPr>
-          <a:xfrm flipH="1">
-            <a:off x="3662813" y="4530372"/>
-            <a:ext cx="2" cy="627388"/>
-          </a:xfrm>
-          <a:prstGeom prst="straightConnector1">
-            <a:avLst/>
-          </a:prstGeom>
-          <a:ln w="9525">
-            <a:solidFill>
-              <a:schemeClr val="tx1"/>
-            </a:solidFill>
-            <a:tailEnd type="triangle"/>
-          </a:ln>
-        </p:spPr>
-        <p:style>
-          <a:lnRef idx="1">
-            <a:schemeClr val="accent1"/>
-          </a:lnRef>
-          <a:fillRef idx="0">
-            <a:schemeClr val="accent1"/>
-          </a:fillRef>
-          <a:effectRef idx="0">
-            <a:schemeClr val="accent1"/>
-          </a:effectRef>
-          <a:fontRef idx="minor">
-            <a:schemeClr val="tx1"/>
-          </a:fontRef>
-        </p:style>
-      </p:cxnSp>
-      <p:sp>
-        <p:nvSpPr>
-          <p:cNvPr id="73" name="TextBox 72"/>
-          <p:cNvSpPr txBox="1"/>
-          <p:nvPr/>
-        </p:nvSpPr>
-        <p:spPr>
-          <a:xfrm>
-            <a:off x="3611385" y="4713099"/>
-            <a:ext cx="1935915" cy="292388"/>
-          </a:xfrm>
-          <a:prstGeom prst="rect">
-            <a:avLst/>
-          </a:prstGeom>
-          <a:noFill/>
-        </p:spPr>
-        <p:txBody>
-          <a:bodyPr wrap="none" rtlCol="0">
-            <a:spAutoFit/>
-          </a:bodyPr>
-          <a:lstStyle/>
-          <a:p>
-            <a:r>
-              <a:rPr lang="de-CH" sz="1300" dirty="0" smtClean="0"/>
-              <a:t>Updated </a:t>
-            </a:r>
-            <a:r>
-              <a:rPr lang="de-CH" sz="1300" dirty="0" err="1" smtClean="0"/>
-              <a:t>Keypoint</a:t>
-            </a:r>
-            <a:r>
-              <a:rPr lang="de-CH" sz="1300" dirty="0" smtClean="0"/>
-              <a:t> </a:t>
-            </a:r>
-            <a:r>
-              <a:rPr lang="de-CH" sz="1300" dirty="0" err="1" smtClean="0"/>
-              <a:t>Tracker</a:t>
-            </a:r>
-            <a:endParaRPr lang="de-CH" sz="1300" dirty="0"/>
-          </a:p>
-        </p:txBody>
-      </p:sp>
-      <p:cxnSp>
-        <p:nvCxnSpPr>
-          <p:cNvPr id="89" name="Straight Arrow Connector 88"/>
-          <p:cNvCxnSpPr/>
-          <p:nvPr/>
-        </p:nvCxnSpPr>
-        <p:spPr>
-          <a:xfrm>
-            <a:off x="2392440" y="5484374"/>
-            <a:ext cx="0" cy="2037200"/>
-          </a:xfrm>
-          <a:prstGeom prst="straightConnector1">
-            <a:avLst/>
-          </a:prstGeom>
-          <a:ln w="9525">
-            <a:solidFill>
-              <a:schemeClr val="tx1"/>
-            </a:solidFill>
-            <a:tailEnd type="triangle"/>
-          </a:ln>
-        </p:spPr>
-        <p:style>
-          <a:lnRef idx="1">
-            <a:schemeClr val="accent1"/>
-          </a:lnRef>
-          <a:fillRef idx="0">
-            <a:schemeClr val="accent1"/>
-          </a:fillRef>
-          <a:effectRef idx="0">
-            <a:schemeClr val="accent1"/>
-          </a:effectRef>
-          <a:fontRef idx="minor">
-            <a:schemeClr val="tx1"/>
-          </a:fontRef>
-        </p:style>
-      </p:cxnSp>
-      <p:sp>
-        <p:nvSpPr>
-          <p:cNvPr id="90" name="TextBox 89"/>
-          <p:cNvSpPr txBox="1"/>
-          <p:nvPr/>
-        </p:nvSpPr>
-        <p:spPr>
-          <a:xfrm>
-            <a:off x="2370223" y="6325682"/>
-            <a:ext cx="922112" cy="530915"/>
-          </a:xfrm>
-          <a:prstGeom prst="rect">
-            <a:avLst/>
-          </a:prstGeom>
-          <a:noFill/>
-        </p:spPr>
-        <p:txBody>
-          <a:bodyPr wrap="none" rtlCol="0">
-            <a:spAutoFit/>
-          </a:bodyPr>
-          <a:lstStyle/>
-          <a:p>
-            <a:pPr>
-              <a:spcAft>
-                <a:spcPts val="300"/>
-              </a:spcAft>
-            </a:pPr>
-            <a:r>
-              <a:rPr lang="de-CH" sz="1300" dirty="0" smtClean="0"/>
-              <a:t>Pose</a:t>
-            </a:r>
-            <a:endParaRPr lang="de-CH" sz="1300" dirty="0" smtClean="0"/>
-          </a:p>
-          <a:p>
-            <a:pPr>
-              <a:spcAft>
-                <a:spcPts val="300"/>
-              </a:spcAft>
-            </a:pPr>
-            <a:r>
-              <a:rPr lang="de-CH" sz="1300" dirty="0" smtClean="0"/>
-              <a:t>Landmarks</a:t>
-            </a:r>
-            <a:endParaRPr lang="de-CH" sz="1300" dirty="0"/>
-          </a:p>
-        </p:txBody>
-      </p:sp>
-      <p:sp>
-        <p:nvSpPr>
-          <p:cNvPr id="93" name="TextBox 92"/>
-          <p:cNvSpPr txBox="1"/>
-          <p:nvPr/>
-        </p:nvSpPr>
-        <p:spPr>
-          <a:xfrm>
-            <a:off x="1130265" y="6325682"/>
-            <a:ext cx="1235403" cy="292388"/>
-          </a:xfrm>
-          <a:prstGeom prst="rect">
-            <a:avLst/>
-          </a:prstGeom>
-          <a:noFill/>
-        </p:spPr>
-        <p:txBody>
-          <a:bodyPr wrap="none" rtlCol="0">
-            <a:spAutoFit/>
-          </a:bodyPr>
-          <a:lstStyle/>
-          <a:p>
-            <a:r>
-              <a:rPr lang="de-CH" sz="1300" dirty="0" err="1" smtClean="0"/>
-              <a:t>Inlier</a:t>
-            </a:r>
-            <a:r>
-              <a:rPr lang="de-CH" sz="1300" dirty="0" smtClean="0"/>
-              <a:t> </a:t>
-            </a:r>
-            <a:r>
-              <a:rPr lang="de-CH" sz="1300" dirty="0" err="1" smtClean="0"/>
-              <a:t>Keypoints</a:t>
-            </a:r>
-            <a:endParaRPr lang="de-CH" sz="1300" dirty="0"/>
-          </a:p>
-        </p:txBody>
-      </p:sp>
-      <p:cxnSp>
-        <p:nvCxnSpPr>
-          <p:cNvPr id="139" name="Straight Arrow Connector 138"/>
-          <p:cNvCxnSpPr/>
-          <p:nvPr/>
-        </p:nvCxnSpPr>
-        <p:spPr>
-          <a:xfrm flipH="1">
-            <a:off x="3662813" y="5490154"/>
-            <a:ext cx="8288" cy="2031420"/>
-          </a:xfrm>
-          <a:prstGeom prst="straightConnector1">
-            <a:avLst/>
-          </a:prstGeom>
-          <a:ln w="9525">
-            <a:solidFill>
-              <a:schemeClr val="tx1"/>
-            </a:solidFill>
-            <a:tailEnd type="triangle"/>
-          </a:ln>
-        </p:spPr>
-        <p:style>
-          <a:lnRef idx="1">
-            <a:schemeClr val="accent1"/>
-          </a:lnRef>
-          <a:fillRef idx="0">
-            <a:schemeClr val="accent1"/>
-          </a:fillRef>
-          <a:effectRef idx="0">
-            <a:schemeClr val="accent1"/>
-          </a:effectRef>
-          <a:fontRef idx="minor">
-            <a:schemeClr val="tx1"/>
-          </a:fontRef>
-        </p:style>
-      </p:cxnSp>
-      <p:sp>
-        <p:nvSpPr>
-          <p:cNvPr id="141" name="TextBox 140"/>
-          <p:cNvSpPr txBox="1"/>
-          <p:nvPr/>
-        </p:nvSpPr>
-        <p:spPr>
-          <a:xfrm>
-            <a:off x="3665213" y="6325682"/>
-            <a:ext cx="1935915" cy="292388"/>
-          </a:xfrm>
-          <a:prstGeom prst="rect">
-            <a:avLst/>
-          </a:prstGeom>
-          <a:noFill/>
-        </p:spPr>
-        <p:txBody>
-          <a:bodyPr wrap="none" rtlCol="0">
-            <a:spAutoFit/>
-          </a:bodyPr>
-          <a:lstStyle/>
-          <a:p>
-            <a:r>
-              <a:rPr lang="de-CH" sz="1300" dirty="0" smtClean="0"/>
-              <a:t>Updated </a:t>
-            </a:r>
-            <a:r>
-              <a:rPr lang="de-CH" sz="1300" dirty="0" err="1" smtClean="0"/>
-              <a:t>Keypoint</a:t>
-            </a:r>
-            <a:r>
-              <a:rPr lang="de-CH" sz="1300" dirty="0" smtClean="0"/>
-              <a:t> </a:t>
-            </a:r>
-            <a:r>
-              <a:rPr lang="de-CH" sz="1300" dirty="0" err="1" smtClean="0"/>
-              <a:t>Tracker</a:t>
-            </a:r>
-            <a:endParaRPr lang="de-CH" sz="1300" dirty="0"/>
-          </a:p>
-        </p:txBody>
-      </p:sp>
-      <p:cxnSp>
-        <p:nvCxnSpPr>
-          <p:cNvPr id="20" name="Elbow Connector 19"/>
-          <p:cNvCxnSpPr>
-            <a:stCxn id="7" idx="3"/>
-          </p:cNvCxnSpPr>
-          <p:nvPr/>
-        </p:nvCxnSpPr>
-        <p:spPr>
-          <a:xfrm>
-            <a:off x="4341045" y="2435259"/>
-            <a:ext cx="259579" cy="1768903"/>
-          </a:xfrm>
-          <a:prstGeom prst="bentConnector2">
-            <a:avLst/>
-          </a:prstGeom>
-          <a:ln w="9525">
-            <a:solidFill>
-              <a:schemeClr val="tx1"/>
-            </a:solidFill>
-            <a:tailEnd type="triangle"/>
-          </a:ln>
-        </p:spPr>
-        <p:style>
-          <a:lnRef idx="1">
-            <a:schemeClr val="accent1"/>
-          </a:lnRef>
-          <a:fillRef idx="0">
-            <a:schemeClr val="accent1"/>
-          </a:fillRef>
-          <a:effectRef idx="0">
-            <a:schemeClr val="accent1"/>
-          </a:effectRef>
-          <a:fontRef idx="minor">
-            <a:schemeClr val="tx1"/>
-          </a:fontRef>
-        </p:style>
-      </p:cxnSp>
-      <p:sp>
-        <p:nvSpPr>
-          <p:cNvPr id="21" name="Rectangle 20"/>
-          <p:cNvSpPr/>
-          <p:nvPr/>
-        </p:nvSpPr>
-        <p:spPr>
-          <a:xfrm>
-            <a:off x="798163" y="1883044"/>
-            <a:ext cx="4943959" cy="3959817"/>
-          </a:xfrm>
-          <a:prstGeom prst="rect">
-            <a:avLst/>
-          </a:prstGeom>
-          <a:noFill/>
-          <a:ln w="25400">
-            <a:solidFill>
-              <a:schemeClr val="tx1"/>
-            </a:solidFill>
-            <a:prstDash val="dash"/>
-          </a:ln>
-        </p:spPr>
-        <p:style>
-          <a:lnRef idx="2">
-            <a:schemeClr val="accent1">
-              <a:shade val="50000"/>
-            </a:schemeClr>
-          </a:lnRef>
-          <a:fillRef idx="1">
-            <a:schemeClr val="accent1"/>
-          </a:fillRef>
-          <a:effectRef idx="0">
-            <a:schemeClr val="accent1"/>
-          </a:effectRef>
-          <a:fontRef idx="minor">
-            <a:schemeClr val="lt1"/>
-          </a:fontRef>
-        </p:style>
-        <p:txBody>
-          <a:bodyPr rtlCol="0" anchor="ctr"/>
-          <a:lstStyle/>
-          <a:p>
-            <a:pPr algn="ctr"/>
-            <a:endParaRPr lang="de-CH"/>
-          </a:p>
-        </p:txBody>
-      </p:sp>
-      <p:cxnSp>
-        <p:nvCxnSpPr>
-          <p:cNvPr id="38" name="Elbow Connector 37"/>
-          <p:cNvCxnSpPr>
-            <a:stCxn id="9" idx="1"/>
-          </p:cNvCxnSpPr>
-          <p:nvPr/>
-        </p:nvCxnSpPr>
-        <p:spPr>
-          <a:xfrm rot="10800000" flipV="1">
-            <a:off x="1190625" y="3401149"/>
-            <a:ext cx="632930" cy="4120425"/>
-          </a:xfrm>
-          <a:prstGeom prst="bentConnector2">
-            <a:avLst/>
-          </a:prstGeom>
-          <a:ln w="9525">
-            <a:solidFill>
-              <a:schemeClr val="tx1"/>
-            </a:solidFill>
-            <a:tailEnd type="triangle"/>
-          </a:ln>
-        </p:spPr>
-        <p:style>
-          <a:lnRef idx="1">
-            <a:schemeClr val="accent1"/>
-          </a:lnRef>
-          <a:fillRef idx="0">
-            <a:schemeClr val="accent1"/>
-          </a:fillRef>
-          <a:effectRef idx="0">
-            <a:schemeClr val="accent1"/>
-          </a:effectRef>
-          <a:fontRef idx="minor">
-            <a:schemeClr val="tx1"/>
-          </a:fontRef>
-        </p:style>
-      </p:cxnSp>
-      <p:cxnSp>
-        <p:nvCxnSpPr>
-          <p:cNvPr id="66" name="Straight Connector 65"/>
-          <p:cNvCxnSpPr/>
-          <p:nvPr/>
-        </p:nvCxnSpPr>
-        <p:spPr>
-          <a:xfrm flipH="1">
-            <a:off x="457201" y="6966977"/>
-            <a:ext cx="1935239" cy="0"/>
-          </a:xfrm>
-          <a:prstGeom prst="line">
-            <a:avLst/>
-          </a:prstGeom>
-          <a:ln w="9525">
-            <a:solidFill>
-              <a:schemeClr val="tx1"/>
-            </a:solidFill>
-          </a:ln>
-        </p:spPr>
-        <p:style>
-          <a:lnRef idx="1">
-            <a:schemeClr val="accent1"/>
-          </a:lnRef>
-          <a:fillRef idx="0">
-            <a:schemeClr val="accent1"/>
-          </a:fillRef>
-          <a:effectRef idx="0">
-            <a:schemeClr val="accent1"/>
-          </a:effectRef>
-          <a:fontRef idx="minor">
-            <a:schemeClr val="tx1"/>
-          </a:fontRef>
-        </p:style>
-      </p:cxnSp>
-      <p:cxnSp>
-        <p:nvCxnSpPr>
-          <p:cNvPr id="69" name="Elbow Connector 68"/>
-          <p:cNvCxnSpPr/>
-          <p:nvPr/>
-        </p:nvCxnSpPr>
-        <p:spPr>
-          <a:xfrm rot="5400000" flipH="1" flipV="1">
-            <a:off x="-1203709" y="3084290"/>
-            <a:ext cx="5551216" cy="2214159"/>
-          </a:xfrm>
-          <a:prstGeom prst="bentConnector3">
-            <a:avLst>
-              <a:gd name="adj1" fmla="val 99974"/>
-            </a:avLst>
-          </a:prstGeom>
-          <a:ln w="9525">
-            <a:solidFill>
-              <a:schemeClr val="tx1"/>
-            </a:solidFill>
-            <a:tailEnd type="triangle"/>
-          </a:ln>
-        </p:spPr>
-        <p:style>
-          <a:lnRef idx="1">
-            <a:schemeClr val="accent1"/>
-          </a:lnRef>
-          <a:fillRef idx="0">
-            <a:schemeClr val="accent1"/>
-          </a:fillRef>
-          <a:effectRef idx="0">
-            <a:schemeClr val="accent1"/>
-          </a:effectRef>
-          <a:fontRef idx="minor">
-            <a:schemeClr val="tx1"/>
-          </a:fontRef>
-        </p:style>
-      </p:cxnSp>
-      <p:cxnSp>
-        <p:nvCxnSpPr>
-          <p:cNvPr id="82" name="Straight Connector 81"/>
-          <p:cNvCxnSpPr/>
-          <p:nvPr/>
-        </p:nvCxnSpPr>
-        <p:spPr>
-          <a:xfrm flipH="1">
-            <a:off x="3662813" y="6966977"/>
-            <a:ext cx="2401154" cy="0"/>
-          </a:xfrm>
-          <a:prstGeom prst="line">
-            <a:avLst/>
-          </a:prstGeom>
-          <a:ln w="9525">
-            <a:solidFill>
-              <a:schemeClr val="tx1"/>
-            </a:solidFill>
-          </a:ln>
-        </p:spPr>
-        <p:style>
-          <a:lnRef idx="1">
-            <a:schemeClr val="accent1"/>
-          </a:lnRef>
-          <a:fillRef idx="0">
-            <a:schemeClr val="accent1"/>
-          </a:fillRef>
-          <a:effectRef idx="0">
-            <a:schemeClr val="accent1"/>
-          </a:effectRef>
-          <a:fontRef idx="minor">
-            <a:schemeClr val="tx1"/>
-          </a:fontRef>
-        </p:style>
-      </p:cxnSp>
-      <p:cxnSp>
-        <p:nvCxnSpPr>
-          <p:cNvPr id="76" name="Elbow Connector 75"/>
-          <p:cNvCxnSpPr/>
-          <p:nvPr/>
-        </p:nvCxnSpPr>
-        <p:spPr>
-          <a:xfrm rot="16200000" flipV="1">
-            <a:off x="2767583" y="3670594"/>
-            <a:ext cx="5551216" cy="1041550"/>
-          </a:xfrm>
-          <a:prstGeom prst="bentConnector3">
-            <a:avLst>
-              <a:gd name="adj1" fmla="val 100017"/>
-            </a:avLst>
-          </a:prstGeom>
-          <a:ln w="9525">
-            <a:solidFill>
-              <a:schemeClr val="tx1"/>
-            </a:solidFill>
-            <a:tailEnd type="triangle"/>
-          </a:ln>
-        </p:spPr>
-        <p:style>
-          <a:lnRef idx="1">
-            <a:schemeClr val="accent1"/>
-          </a:lnRef>
-          <a:fillRef idx="0">
-            <a:schemeClr val="accent1"/>
-          </a:fillRef>
-          <a:effectRef idx="0">
-            <a:schemeClr val="accent1"/>
-          </a:effectRef>
-          <a:fontRef idx="minor">
-            <a:schemeClr val="tx1"/>
-          </a:fontRef>
-        </p:style>
-      </p:cxnSp>
+            </a:fontRef>
+          </p:style>
+        </p:cxnSp>
+        <p:sp>
+          <p:nvSpPr>
+            <p:cNvPr id="126" name="TextBox 125"/>
+            <p:cNvSpPr txBox="1"/>
+            <p:nvPr/>
+          </p:nvSpPr>
+          <p:spPr>
+            <a:xfrm>
+              <a:off x="1281113" y="6072188"/>
+              <a:ext cx="261610" cy="276999"/>
+            </a:xfrm>
+            <a:prstGeom prst="rect">
+              <a:avLst/>
+            </a:prstGeom>
+            <a:noFill/>
+          </p:spPr>
+          <p:txBody>
+            <a:bodyPr wrap="none" rtlCol="0">
+              <a:spAutoFit/>
+            </a:bodyPr>
+            <a:lstStyle/>
+            <a:p>
+              <a:r>
+                <a:rPr lang="de-CH" sz="1200" dirty="0" smtClean="0"/>
+                <a:t>+</a:t>
+              </a:r>
+              <a:endParaRPr lang="de-CH" dirty="0"/>
+            </a:p>
+          </p:txBody>
+        </p:sp>
+      </p:grpSp>
     </p:spTree>
     <p:extLst>
       <p:ext uri="{BB962C8B-B14F-4D97-AF65-F5344CB8AC3E}">

</xml_diff>